<commit_message>
Added Simple Neural Network Model
</commit_message>
<xml_diff>
--- a/Diagrams.pptx
+++ b/Diagrams.pptx
@@ -7,6 +7,8 @@
   <p:sldIdLst>
     <p:sldId id="256" r:id="rId2"/>
     <p:sldId id="257" r:id="rId3"/>
+    <p:sldId id="258" r:id="rId4"/>
+    <p:sldId id="259" r:id="rId5"/>
   </p:sldIdLst>
   <p:sldSz cx="12192000" cy="6858000"/>
   <p:notesSz cx="6858000" cy="9144000"/>
@@ -105,6 +107,11 @@
       </a:defRPr>
     </a:lvl9pPr>
   </p:defaultTextStyle>
+  <p:extLst>
+    <p:ext uri="{EFAFB233-063F-42B5-8137-9DF3F51BA10A}">
+      <p15:sldGuideLst xmlns:p15="http://schemas.microsoft.com/office/powerpoint/2012/main"/>
+    </p:ext>
+  </p:extLst>
 </p:presentation>
 </file>
 
@@ -255,7 +262,7 @@
           <a:p>
             <a:fld id="{4D8D074D-F150-4825-8FFB-8231204DF261}" type="datetimeFigureOut">
               <a:rPr lang="en-US" smtClean="0"/>
-              <a:t>12/30/2021</a:t>
+              <a:t>1/5/2022</a:t>
             </a:fld>
             <a:endParaRPr lang="en-US"/>
           </a:p>
@@ -453,7 +460,7 @@
           <a:p>
             <a:fld id="{4D8D074D-F150-4825-8FFB-8231204DF261}" type="datetimeFigureOut">
               <a:rPr lang="en-US" smtClean="0"/>
-              <a:t>12/30/2021</a:t>
+              <a:t>1/5/2022</a:t>
             </a:fld>
             <a:endParaRPr lang="en-US"/>
           </a:p>
@@ -661,7 +668,7 @@
           <a:p>
             <a:fld id="{4D8D074D-F150-4825-8FFB-8231204DF261}" type="datetimeFigureOut">
               <a:rPr lang="en-US" smtClean="0"/>
-              <a:t>12/30/2021</a:t>
+              <a:t>1/5/2022</a:t>
             </a:fld>
             <a:endParaRPr lang="en-US"/>
           </a:p>
@@ -859,7 +866,7 @@
           <a:p>
             <a:fld id="{4D8D074D-F150-4825-8FFB-8231204DF261}" type="datetimeFigureOut">
               <a:rPr lang="en-US" smtClean="0"/>
-              <a:t>12/30/2021</a:t>
+              <a:t>1/5/2022</a:t>
             </a:fld>
             <a:endParaRPr lang="en-US"/>
           </a:p>
@@ -1134,7 +1141,7 @@
           <a:p>
             <a:fld id="{4D8D074D-F150-4825-8FFB-8231204DF261}" type="datetimeFigureOut">
               <a:rPr lang="en-US" smtClean="0"/>
-              <a:t>12/30/2021</a:t>
+              <a:t>1/5/2022</a:t>
             </a:fld>
             <a:endParaRPr lang="en-US"/>
           </a:p>
@@ -1399,7 +1406,7 @@
           <a:p>
             <a:fld id="{4D8D074D-F150-4825-8FFB-8231204DF261}" type="datetimeFigureOut">
               <a:rPr lang="en-US" smtClean="0"/>
-              <a:t>12/30/2021</a:t>
+              <a:t>1/5/2022</a:t>
             </a:fld>
             <a:endParaRPr lang="en-US"/>
           </a:p>
@@ -1811,7 +1818,7 @@
           <a:p>
             <a:fld id="{4D8D074D-F150-4825-8FFB-8231204DF261}" type="datetimeFigureOut">
               <a:rPr lang="en-US" smtClean="0"/>
-              <a:t>12/30/2021</a:t>
+              <a:t>1/5/2022</a:t>
             </a:fld>
             <a:endParaRPr lang="en-US"/>
           </a:p>
@@ -1952,7 +1959,7 @@
           <a:p>
             <a:fld id="{4D8D074D-F150-4825-8FFB-8231204DF261}" type="datetimeFigureOut">
               <a:rPr lang="en-US" smtClean="0"/>
-              <a:t>12/30/2021</a:t>
+              <a:t>1/5/2022</a:t>
             </a:fld>
             <a:endParaRPr lang="en-US"/>
           </a:p>
@@ -2065,7 +2072,7 @@
           <a:p>
             <a:fld id="{4D8D074D-F150-4825-8FFB-8231204DF261}" type="datetimeFigureOut">
               <a:rPr lang="en-US" smtClean="0"/>
-              <a:t>12/30/2021</a:t>
+              <a:t>1/5/2022</a:t>
             </a:fld>
             <a:endParaRPr lang="en-US"/>
           </a:p>
@@ -2376,7 +2383,7 @@
           <a:p>
             <a:fld id="{4D8D074D-F150-4825-8FFB-8231204DF261}" type="datetimeFigureOut">
               <a:rPr lang="en-US" smtClean="0"/>
-              <a:t>12/30/2021</a:t>
+              <a:t>1/5/2022</a:t>
             </a:fld>
             <a:endParaRPr lang="en-US"/>
           </a:p>
@@ -2664,7 +2671,7 @@
           <a:p>
             <a:fld id="{4D8D074D-F150-4825-8FFB-8231204DF261}" type="datetimeFigureOut">
               <a:rPr lang="en-US" smtClean="0"/>
-              <a:t>12/30/2021</a:t>
+              <a:t>1/5/2022</a:t>
             </a:fld>
             <a:endParaRPr lang="en-US"/>
           </a:p>
@@ -2905,7 +2912,7 @@
           <a:p>
             <a:fld id="{4D8D074D-F150-4825-8FFB-8231204DF261}" type="datetimeFigureOut">
               <a:rPr lang="en-US" smtClean="0"/>
-              <a:t>12/30/2021</a:t>
+              <a:t>1/5/2022</a:t>
             </a:fld>
             <a:endParaRPr lang="en-US"/>
           </a:p>
@@ -4864,8 +4871,8 @@
           </a:p>
         </p:txBody>
       </p:sp>
-      <mc:AlternateContent xmlns:mc="http://schemas.openxmlformats.org/markup-compatibility/2006">
-        <mc:Choice xmlns:a14="http://schemas.microsoft.com/office/drawing/2010/main" Requires="a14">
+      <mc:AlternateContent xmlns:mc="http://schemas.openxmlformats.org/markup-compatibility/2006" xmlns:a14="http://schemas.microsoft.com/office/drawing/2010/main">
+        <mc:Choice Requires="a14">
           <p:sp>
             <p:nvSpPr>
               <p:cNvPr id="83" name="TextBox 82">
@@ -5102,7 +5109,7 @@
             </p:txBody>
           </p:sp>
         </mc:Choice>
-        <mc:Fallback>
+        <mc:Fallback xmlns="">
           <p:sp>
             <p:nvSpPr>
               <p:cNvPr id="83" name="TextBox 82">
@@ -5147,8 +5154,8 @@
           </p:sp>
         </mc:Fallback>
       </mc:AlternateContent>
-      <mc:AlternateContent xmlns:mc="http://schemas.openxmlformats.org/markup-compatibility/2006">
-        <mc:Choice xmlns:a14="http://schemas.microsoft.com/office/drawing/2010/main" Requires="a14">
+      <mc:AlternateContent xmlns:mc="http://schemas.openxmlformats.org/markup-compatibility/2006" xmlns:a14="http://schemas.microsoft.com/office/drawing/2010/main">
+        <mc:Choice Requires="a14">
           <p:sp>
             <p:nvSpPr>
               <p:cNvPr id="85" name="TextBox 84">
@@ -5385,7 +5392,7 @@
             </p:txBody>
           </p:sp>
         </mc:Choice>
-        <mc:Fallback>
+        <mc:Fallback xmlns="">
           <p:sp>
             <p:nvSpPr>
               <p:cNvPr id="85" name="TextBox 84">
@@ -6067,6 +6074,3834 @@
     <p:extLst>
       <p:ext uri="{BB962C8B-B14F-4D97-AF65-F5344CB8AC3E}">
         <p14:creationId xmlns:p14="http://schemas.microsoft.com/office/powerpoint/2010/main" val="811492986"/>
+      </p:ext>
+    </p:extLst>
+  </p:cSld>
+  <p:clrMapOvr>
+    <a:masterClrMapping/>
+  </p:clrMapOvr>
+</p:sld>
+</file>
+
+<file path=ppt/slides/slide3.xml><?xml version="1.0" encoding="utf-8"?>
+<p:sld xmlns:a="http://schemas.openxmlformats.org/drawingml/2006/main" xmlns:r="http://schemas.openxmlformats.org/officeDocument/2006/relationships" xmlns:p="http://schemas.openxmlformats.org/presentationml/2006/main">
+  <p:cSld>
+    <p:spTree>
+      <p:nvGrpSpPr>
+        <p:cNvPr id="1" name=""/>
+        <p:cNvGrpSpPr/>
+        <p:nvPr/>
+      </p:nvGrpSpPr>
+      <p:grpSpPr>
+        <a:xfrm>
+          <a:off x="0" y="0"/>
+          <a:ext cx="0" cy="0"/>
+          <a:chOff x="0" y="0"/>
+          <a:chExt cx="0" cy="0"/>
+        </a:xfrm>
+      </p:grpSpPr>
+      <p:sp>
+        <p:nvSpPr>
+          <p:cNvPr id="4" name="Flowchart: Connector 3">
+            <a:extLst>
+              <a:ext uri="{FF2B5EF4-FFF2-40B4-BE49-F238E27FC236}">
+                <a16:creationId xmlns:a16="http://schemas.microsoft.com/office/drawing/2014/main" id="{99838A6A-F8A4-44A2-9D53-86747E06BB4A}"/>
+              </a:ext>
+            </a:extLst>
+          </p:cNvPr>
+          <p:cNvSpPr>
+            <a:spLocks noChangeAspect="1"/>
+          </p:cNvSpPr>
+          <p:nvPr/>
+        </p:nvSpPr>
+        <p:spPr>
+          <a:xfrm>
+            <a:off x="1846385" y="2363048"/>
+            <a:ext cx="457200" cy="457200"/>
+          </a:xfrm>
+          <a:prstGeom prst="flowChartConnector">
+            <a:avLst/>
+          </a:prstGeom>
+          <a:noFill/>
+        </p:spPr>
+        <p:style>
+          <a:lnRef idx="2">
+            <a:schemeClr val="accent1">
+              <a:shade val="50000"/>
+            </a:schemeClr>
+          </a:lnRef>
+          <a:fillRef idx="1">
+            <a:schemeClr val="accent1"/>
+          </a:fillRef>
+          <a:effectRef idx="0">
+            <a:schemeClr val="accent1"/>
+          </a:effectRef>
+          <a:fontRef idx="minor">
+            <a:schemeClr val="lt1"/>
+          </a:fontRef>
+        </p:style>
+        <p:txBody>
+          <a:bodyPr rtlCol="0" anchor="ctr"/>
+          <a:lstStyle/>
+          <a:p>
+            <a:pPr algn="ctr"/>
+            <a:r>
+              <a:rPr lang="en-US" sz="1050" dirty="0">
+                <a:solidFill>
+                  <a:schemeClr val="tx1"/>
+                </a:solidFill>
+              </a:rPr>
+              <a:t>X</a:t>
+            </a:r>
+            <a:r>
+              <a:rPr lang="en-US" sz="1050" baseline="-25000" dirty="0">
+                <a:solidFill>
+                  <a:schemeClr val="tx1"/>
+                </a:solidFill>
+              </a:rPr>
+              <a:t>1</a:t>
+            </a:r>
+          </a:p>
+        </p:txBody>
+      </p:sp>
+      <p:sp>
+        <p:nvSpPr>
+          <p:cNvPr id="5" name="Flowchart: Connector 4">
+            <a:extLst>
+              <a:ext uri="{FF2B5EF4-FFF2-40B4-BE49-F238E27FC236}">
+                <a16:creationId xmlns:a16="http://schemas.microsoft.com/office/drawing/2014/main" id="{F89F47B6-40FC-44AF-B293-5CE81B10380C}"/>
+              </a:ext>
+            </a:extLst>
+          </p:cNvPr>
+          <p:cNvSpPr>
+            <a:spLocks noChangeAspect="1"/>
+          </p:cNvSpPr>
+          <p:nvPr/>
+        </p:nvSpPr>
+        <p:spPr>
+          <a:xfrm>
+            <a:off x="1846385" y="3450125"/>
+            <a:ext cx="457200" cy="457200"/>
+          </a:xfrm>
+          <a:prstGeom prst="flowChartConnector">
+            <a:avLst/>
+          </a:prstGeom>
+          <a:noFill/>
+        </p:spPr>
+        <p:style>
+          <a:lnRef idx="2">
+            <a:schemeClr val="accent1">
+              <a:shade val="50000"/>
+            </a:schemeClr>
+          </a:lnRef>
+          <a:fillRef idx="1">
+            <a:schemeClr val="accent1"/>
+          </a:fillRef>
+          <a:effectRef idx="0">
+            <a:schemeClr val="accent1"/>
+          </a:effectRef>
+          <a:fontRef idx="minor">
+            <a:schemeClr val="lt1"/>
+          </a:fontRef>
+        </p:style>
+        <p:txBody>
+          <a:bodyPr rtlCol="0" anchor="ctr"/>
+          <a:lstStyle/>
+          <a:p>
+            <a:pPr algn="ctr"/>
+            <a:r>
+              <a:rPr lang="en-US" sz="1050" dirty="0">
+                <a:solidFill>
+                  <a:schemeClr val="tx1"/>
+                </a:solidFill>
+              </a:rPr>
+              <a:t>X</a:t>
+            </a:r>
+            <a:r>
+              <a:rPr lang="en-US" sz="1050" baseline="-25000" dirty="0">
+                <a:solidFill>
+                  <a:schemeClr val="tx1"/>
+                </a:solidFill>
+              </a:rPr>
+              <a:t>2</a:t>
+            </a:r>
+          </a:p>
+        </p:txBody>
+      </p:sp>
+      <p:sp>
+        <p:nvSpPr>
+          <p:cNvPr id="6" name="Flowchart: Connector 5">
+            <a:extLst>
+              <a:ext uri="{FF2B5EF4-FFF2-40B4-BE49-F238E27FC236}">
+                <a16:creationId xmlns:a16="http://schemas.microsoft.com/office/drawing/2014/main" id="{AB800AF9-73B4-4D1B-A332-C2C07988B457}"/>
+              </a:ext>
+            </a:extLst>
+          </p:cNvPr>
+          <p:cNvSpPr>
+            <a:spLocks noChangeAspect="1"/>
+          </p:cNvSpPr>
+          <p:nvPr/>
+        </p:nvSpPr>
+        <p:spPr>
+          <a:xfrm>
+            <a:off x="1846385" y="4537201"/>
+            <a:ext cx="457200" cy="457200"/>
+          </a:xfrm>
+          <a:prstGeom prst="flowChartConnector">
+            <a:avLst/>
+          </a:prstGeom>
+          <a:noFill/>
+        </p:spPr>
+        <p:style>
+          <a:lnRef idx="2">
+            <a:schemeClr val="accent1">
+              <a:shade val="50000"/>
+            </a:schemeClr>
+          </a:lnRef>
+          <a:fillRef idx="1">
+            <a:schemeClr val="accent1"/>
+          </a:fillRef>
+          <a:effectRef idx="0">
+            <a:schemeClr val="accent1"/>
+          </a:effectRef>
+          <a:fontRef idx="minor">
+            <a:schemeClr val="lt1"/>
+          </a:fontRef>
+        </p:style>
+        <p:txBody>
+          <a:bodyPr rtlCol="0" anchor="ctr"/>
+          <a:lstStyle/>
+          <a:p>
+            <a:pPr algn="ctr"/>
+            <a:r>
+              <a:rPr lang="en-US" sz="1050" dirty="0">
+                <a:solidFill>
+                  <a:schemeClr val="tx1"/>
+                </a:solidFill>
+              </a:rPr>
+              <a:t>b</a:t>
+            </a:r>
+            <a:r>
+              <a:rPr lang="en-US" sz="1050" baseline="-25000" dirty="0">
+                <a:solidFill>
+                  <a:schemeClr val="tx1"/>
+                </a:solidFill>
+              </a:rPr>
+              <a:t>1</a:t>
+            </a:r>
+          </a:p>
+        </p:txBody>
+      </p:sp>
+      <p:grpSp>
+        <p:nvGrpSpPr>
+          <p:cNvPr id="13" name="Group 12">
+            <a:extLst>
+              <a:ext uri="{FF2B5EF4-FFF2-40B4-BE49-F238E27FC236}">
+                <a16:creationId xmlns:a16="http://schemas.microsoft.com/office/drawing/2014/main" id="{E7E10AA5-FEB2-497C-97E5-1186A0EDCC29}"/>
+              </a:ext>
+            </a:extLst>
+          </p:cNvPr>
+          <p:cNvGrpSpPr/>
+          <p:nvPr/>
+        </p:nvGrpSpPr>
+        <p:grpSpPr>
+          <a:xfrm>
+            <a:off x="3529898" y="1161671"/>
+            <a:ext cx="685800" cy="685800"/>
+            <a:chOff x="3874757" y="1546999"/>
+            <a:chExt cx="685800" cy="685800"/>
+          </a:xfrm>
+        </p:grpSpPr>
+        <p:sp>
+          <p:nvSpPr>
+            <p:cNvPr id="7" name="Flowchart: Connector 6">
+              <a:extLst>
+                <a:ext uri="{FF2B5EF4-FFF2-40B4-BE49-F238E27FC236}">
+                  <a16:creationId xmlns:a16="http://schemas.microsoft.com/office/drawing/2014/main" id="{24A2D05F-4046-428C-9CDE-15807124A892}"/>
+                </a:ext>
+              </a:extLst>
+            </p:cNvPr>
+            <p:cNvSpPr>
+              <a:spLocks noChangeAspect="1"/>
+            </p:cNvSpPr>
+            <p:nvPr/>
+          </p:nvSpPr>
+          <p:spPr>
+            <a:xfrm>
+              <a:off x="3874757" y="1546999"/>
+              <a:ext cx="685800" cy="685800"/>
+            </a:xfrm>
+            <a:prstGeom prst="flowChartConnector">
+              <a:avLst/>
+            </a:prstGeom>
+            <a:noFill/>
+          </p:spPr>
+          <p:style>
+            <a:lnRef idx="2">
+              <a:schemeClr val="accent1">
+                <a:shade val="50000"/>
+              </a:schemeClr>
+            </a:lnRef>
+            <a:fillRef idx="1">
+              <a:schemeClr val="accent1"/>
+            </a:fillRef>
+            <a:effectRef idx="0">
+              <a:schemeClr val="accent1"/>
+            </a:effectRef>
+            <a:fontRef idx="minor">
+              <a:schemeClr val="lt1"/>
+            </a:fontRef>
+          </p:style>
+          <p:txBody>
+            <a:bodyPr rtlCol="0" anchor="ctr"/>
+            <a:lstStyle/>
+            <a:p>
+              <a:pPr algn="ctr"/>
+              <a:endParaRPr lang="en-US" sz="1050" baseline="-25000" dirty="0">
+                <a:solidFill>
+                  <a:schemeClr val="tx1"/>
+                </a:solidFill>
+              </a:endParaRPr>
+            </a:p>
+          </p:txBody>
+        </p:sp>
+        <p:cxnSp>
+          <p:nvCxnSpPr>
+            <p:cNvPr id="9" name="Straight Connector 8">
+              <a:extLst>
+                <a:ext uri="{FF2B5EF4-FFF2-40B4-BE49-F238E27FC236}">
+                  <a16:creationId xmlns:a16="http://schemas.microsoft.com/office/drawing/2014/main" id="{63BF2BB9-8F80-4342-A382-B61D1CF61374}"/>
+                </a:ext>
+              </a:extLst>
+            </p:cNvPr>
+            <p:cNvCxnSpPr>
+              <a:stCxn id="7" idx="0"/>
+              <a:endCxn id="7" idx="4"/>
+            </p:cNvCxnSpPr>
+            <p:nvPr/>
+          </p:nvCxnSpPr>
+          <p:spPr>
+            <a:xfrm>
+              <a:off x="4217657" y="1546999"/>
+              <a:ext cx="0" cy="685800"/>
+            </a:xfrm>
+            <a:prstGeom prst="line">
+              <a:avLst/>
+            </a:prstGeom>
+          </p:spPr>
+          <p:style>
+            <a:lnRef idx="1">
+              <a:schemeClr val="accent1"/>
+            </a:lnRef>
+            <a:fillRef idx="0">
+              <a:schemeClr val="accent1"/>
+            </a:fillRef>
+            <a:effectRef idx="0">
+              <a:schemeClr val="accent1"/>
+            </a:effectRef>
+            <a:fontRef idx="minor">
+              <a:schemeClr val="tx1"/>
+            </a:fontRef>
+          </p:style>
+        </p:cxnSp>
+        <p:sp>
+          <p:nvSpPr>
+            <p:cNvPr id="10" name="TextBox 9">
+              <a:extLst>
+                <a:ext uri="{FF2B5EF4-FFF2-40B4-BE49-F238E27FC236}">
+                  <a16:creationId xmlns:a16="http://schemas.microsoft.com/office/drawing/2014/main" id="{2E26BF6C-1382-47F3-8299-FAEA298E0166}"/>
+                </a:ext>
+              </a:extLst>
+            </p:cNvPr>
+            <p:cNvSpPr txBox="1"/>
+            <p:nvPr/>
+          </p:nvSpPr>
+          <p:spPr>
+            <a:xfrm>
+              <a:off x="3962123" y="1666741"/>
+              <a:ext cx="253440" cy="338554"/>
+            </a:xfrm>
+            <a:prstGeom prst="rect">
+              <a:avLst/>
+            </a:prstGeom>
+            <a:noFill/>
+          </p:spPr>
+          <p:txBody>
+            <a:bodyPr wrap="square" rtlCol="0">
+              <a:spAutoFit/>
+            </a:bodyPr>
+            <a:lstStyle/>
+            <a:p>
+              <a:r>
+                <a:rPr lang="en-US" sz="2400" baseline="-25000" dirty="0"/>
+                <a:t>z</a:t>
+              </a:r>
+            </a:p>
+          </p:txBody>
+        </p:sp>
+        <p:sp>
+          <p:nvSpPr>
+            <p:cNvPr id="12" name="TextBox 11">
+              <a:extLst>
+                <a:ext uri="{FF2B5EF4-FFF2-40B4-BE49-F238E27FC236}">
+                  <a16:creationId xmlns:a16="http://schemas.microsoft.com/office/drawing/2014/main" id="{BABA678C-E604-4D67-A276-D12EDE3FB350}"/>
+                </a:ext>
+              </a:extLst>
+            </p:cNvPr>
+            <p:cNvSpPr txBox="1"/>
+            <p:nvPr/>
+          </p:nvSpPr>
+          <p:spPr>
+            <a:xfrm>
+              <a:off x="4216124" y="1666741"/>
+              <a:ext cx="253440" cy="338554"/>
+            </a:xfrm>
+            <a:prstGeom prst="rect">
+              <a:avLst/>
+            </a:prstGeom>
+            <a:noFill/>
+          </p:spPr>
+          <p:txBody>
+            <a:bodyPr wrap="square" rtlCol="0">
+              <a:spAutoFit/>
+            </a:bodyPr>
+            <a:lstStyle/>
+            <a:p>
+              <a:r>
+                <a:rPr lang="en-US" sz="2400" baseline="-25000" dirty="0"/>
+                <a:t>a</a:t>
+              </a:r>
+            </a:p>
+          </p:txBody>
+        </p:sp>
+      </p:grpSp>
+      <p:grpSp>
+        <p:nvGrpSpPr>
+          <p:cNvPr id="14" name="Group 13">
+            <a:extLst>
+              <a:ext uri="{FF2B5EF4-FFF2-40B4-BE49-F238E27FC236}">
+                <a16:creationId xmlns:a16="http://schemas.microsoft.com/office/drawing/2014/main" id="{1362F838-C38B-4EBC-A66E-D10AB14F1BC9}"/>
+              </a:ext>
+            </a:extLst>
+          </p:cNvPr>
+          <p:cNvGrpSpPr/>
+          <p:nvPr/>
+        </p:nvGrpSpPr>
+        <p:grpSpPr>
+          <a:xfrm>
+            <a:off x="3529898" y="2248748"/>
+            <a:ext cx="685800" cy="685800"/>
+            <a:chOff x="3874757" y="1546999"/>
+            <a:chExt cx="685800" cy="685800"/>
+          </a:xfrm>
+        </p:grpSpPr>
+        <p:sp>
+          <p:nvSpPr>
+            <p:cNvPr id="15" name="Flowchart: Connector 14">
+              <a:extLst>
+                <a:ext uri="{FF2B5EF4-FFF2-40B4-BE49-F238E27FC236}">
+                  <a16:creationId xmlns:a16="http://schemas.microsoft.com/office/drawing/2014/main" id="{6A914760-71C6-4F84-99AB-940FEFA83479}"/>
+                </a:ext>
+              </a:extLst>
+            </p:cNvPr>
+            <p:cNvSpPr>
+              <a:spLocks noChangeAspect="1"/>
+            </p:cNvSpPr>
+            <p:nvPr/>
+          </p:nvSpPr>
+          <p:spPr>
+            <a:xfrm>
+              <a:off x="3874757" y="1546999"/>
+              <a:ext cx="685800" cy="685800"/>
+            </a:xfrm>
+            <a:prstGeom prst="flowChartConnector">
+              <a:avLst/>
+            </a:prstGeom>
+            <a:noFill/>
+          </p:spPr>
+          <p:style>
+            <a:lnRef idx="2">
+              <a:schemeClr val="accent1">
+                <a:shade val="50000"/>
+              </a:schemeClr>
+            </a:lnRef>
+            <a:fillRef idx="1">
+              <a:schemeClr val="accent1"/>
+            </a:fillRef>
+            <a:effectRef idx="0">
+              <a:schemeClr val="accent1"/>
+            </a:effectRef>
+            <a:fontRef idx="minor">
+              <a:schemeClr val="lt1"/>
+            </a:fontRef>
+          </p:style>
+          <p:txBody>
+            <a:bodyPr rtlCol="0" anchor="ctr"/>
+            <a:lstStyle/>
+            <a:p>
+              <a:pPr algn="ctr"/>
+              <a:endParaRPr lang="en-US" sz="1050" baseline="-25000" dirty="0">
+                <a:solidFill>
+                  <a:schemeClr val="tx1"/>
+                </a:solidFill>
+              </a:endParaRPr>
+            </a:p>
+          </p:txBody>
+        </p:sp>
+        <p:cxnSp>
+          <p:nvCxnSpPr>
+            <p:cNvPr id="16" name="Straight Connector 15">
+              <a:extLst>
+                <a:ext uri="{FF2B5EF4-FFF2-40B4-BE49-F238E27FC236}">
+                  <a16:creationId xmlns:a16="http://schemas.microsoft.com/office/drawing/2014/main" id="{B67F333D-A8A6-4474-82CC-9A84A9CB648B}"/>
+                </a:ext>
+              </a:extLst>
+            </p:cNvPr>
+            <p:cNvCxnSpPr>
+              <a:stCxn id="15" idx="0"/>
+              <a:endCxn id="15" idx="4"/>
+            </p:cNvCxnSpPr>
+            <p:nvPr/>
+          </p:nvCxnSpPr>
+          <p:spPr>
+            <a:xfrm>
+              <a:off x="4217657" y="1546999"/>
+              <a:ext cx="0" cy="685800"/>
+            </a:xfrm>
+            <a:prstGeom prst="line">
+              <a:avLst/>
+            </a:prstGeom>
+          </p:spPr>
+          <p:style>
+            <a:lnRef idx="1">
+              <a:schemeClr val="accent1"/>
+            </a:lnRef>
+            <a:fillRef idx="0">
+              <a:schemeClr val="accent1"/>
+            </a:fillRef>
+            <a:effectRef idx="0">
+              <a:schemeClr val="accent1"/>
+            </a:effectRef>
+            <a:fontRef idx="minor">
+              <a:schemeClr val="tx1"/>
+            </a:fontRef>
+          </p:style>
+        </p:cxnSp>
+        <p:sp>
+          <p:nvSpPr>
+            <p:cNvPr id="17" name="TextBox 16">
+              <a:extLst>
+                <a:ext uri="{FF2B5EF4-FFF2-40B4-BE49-F238E27FC236}">
+                  <a16:creationId xmlns:a16="http://schemas.microsoft.com/office/drawing/2014/main" id="{B7637F04-18B6-4A93-993A-30E74C5BF39B}"/>
+                </a:ext>
+              </a:extLst>
+            </p:cNvPr>
+            <p:cNvSpPr txBox="1"/>
+            <p:nvPr/>
+          </p:nvSpPr>
+          <p:spPr>
+            <a:xfrm>
+              <a:off x="3962123" y="1666741"/>
+              <a:ext cx="253440" cy="338554"/>
+            </a:xfrm>
+            <a:prstGeom prst="rect">
+              <a:avLst/>
+            </a:prstGeom>
+            <a:noFill/>
+          </p:spPr>
+          <p:txBody>
+            <a:bodyPr wrap="square" rtlCol="0">
+              <a:spAutoFit/>
+            </a:bodyPr>
+            <a:lstStyle/>
+            <a:p>
+              <a:r>
+                <a:rPr lang="en-US" sz="2400" baseline="-25000" dirty="0"/>
+                <a:t>z</a:t>
+              </a:r>
+            </a:p>
+          </p:txBody>
+        </p:sp>
+        <p:sp>
+          <p:nvSpPr>
+            <p:cNvPr id="18" name="TextBox 17">
+              <a:extLst>
+                <a:ext uri="{FF2B5EF4-FFF2-40B4-BE49-F238E27FC236}">
+                  <a16:creationId xmlns:a16="http://schemas.microsoft.com/office/drawing/2014/main" id="{48A7CCA6-F115-4D6D-8AE3-BD1800F7774C}"/>
+                </a:ext>
+              </a:extLst>
+            </p:cNvPr>
+            <p:cNvSpPr txBox="1"/>
+            <p:nvPr/>
+          </p:nvSpPr>
+          <p:spPr>
+            <a:xfrm>
+              <a:off x="4216124" y="1666741"/>
+              <a:ext cx="253440" cy="338554"/>
+            </a:xfrm>
+            <a:prstGeom prst="rect">
+              <a:avLst/>
+            </a:prstGeom>
+            <a:noFill/>
+          </p:spPr>
+          <p:txBody>
+            <a:bodyPr wrap="square" rtlCol="0">
+              <a:spAutoFit/>
+            </a:bodyPr>
+            <a:lstStyle/>
+            <a:p>
+              <a:r>
+                <a:rPr lang="en-US" sz="2400" baseline="-25000" dirty="0"/>
+                <a:t>a</a:t>
+              </a:r>
+            </a:p>
+          </p:txBody>
+        </p:sp>
+      </p:grpSp>
+      <p:grpSp>
+        <p:nvGrpSpPr>
+          <p:cNvPr id="24" name="Group 23">
+            <a:extLst>
+              <a:ext uri="{FF2B5EF4-FFF2-40B4-BE49-F238E27FC236}">
+                <a16:creationId xmlns:a16="http://schemas.microsoft.com/office/drawing/2014/main" id="{B87814BF-16F3-48FB-A8A2-9C496E1930B7}"/>
+              </a:ext>
+            </a:extLst>
+          </p:cNvPr>
+          <p:cNvGrpSpPr/>
+          <p:nvPr/>
+        </p:nvGrpSpPr>
+        <p:grpSpPr>
+          <a:xfrm>
+            <a:off x="3529898" y="3335825"/>
+            <a:ext cx="685800" cy="685800"/>
+            <a:chOff x="3874757" y="1546999"/>
+            <a:chExt cx="685800" cy="685800"/>
+          </a:xfrm>
+        </p:grpSpPr>
+        <p:sp>
+          <p:nvSpPr>
+            <p:cNvPr id="25" name="Flowchart: Connector 24">
+              <a:extLst>
+                <a:ext uri="{FF2B5EF4-FFF2-40B4-BE49-F238E27FC236}">
+                  <a16:creationId xmlns:a16="http://schemas.microsoft.com/office/drawing/2014/main" id="{430C6D9D-1502-4C19-BBDC-6A73BE4DF022}"/>
+                </a:ext>
+              </a:extLst>
+            </p:cNvPr>
+            <p:cNvSpPr>
+              <a:spLocks noChangeAspect="1"/>
+            </p:cNvSpPr>
+            <p:nvPr/>
+          </p:nvSpPr>
+          <p:spPr>
+            <a:xfrm>
+              <a:off x="3874757" y="1546999"/>
+              <a:ext cx="685800" cy="685800"/>
+            </a:xfrm>
+            <a:prstGeom prst="flowChartConnector">
+              <a:avLst/>
+            </a:prstGeom>
+            <a:noFill/>
+          </p:spPr>
+          <p:style>
+            <a:lnRef idx="2">
+              <a:schemeClr val="accent1">
+                <a:shade val="50000"/>
+              </a:schemeClr>
+            </a:lnRef>
+            <a:fillRef idx="1">
+              <a:schemeClr val="accent1"/>
+            </a:fillRef>
+            <a:effectRef idx="0">
+              <a:schemeClr val="accent1"/>
+            </a:effectRef>
+            <a:fontRef idx="minor">
+              <a:schemeClr val="lt1"/>
+            </a:fontRef>
+          </p:style>
+          <p:txBody>
+            <a:bodyPr rtlCol="0" anchor="ctr"/>
+            <a:lstStyle/>
+            <a:p>
+              <a:pPr algn="ctr"/>
+              <a:endParaRPr lang="en-US" sz="1050" baseline="-25000" dirty="0">
+                <a:solidFill>
+                  <a:schemeClr val="tx1"/>
+                </a:solidFill>
+              </a:endParaRPr>
+            </a:p>
+          </p:txBody>
+        </p:sp>
+        <p:cxnSp>
+          <p:nvCxnSpPr>
+            <p:cNvPr id="26" name="Straight Connector 25">
+              <a:extLst>
+                <a:ext uri="{FF2B5EF4-FFF2-40B4-BE49-F238E27FC236}">
+                  <a16:creationId xmlns:a16="http://schemas.microsoft.com/office/drawing/2014/main" id="{A73379A4-7B08-493C-BD6F-F529FAB2F945}"/>
+                </a:ext>
+              </a:extLst>
+            </p:cNvPr>
+            <p:cNvCxnSpPr>
+              <a:stCxn id="25" idx="0"/>
+              <a:endCxn id="25" idx="4"/>
+            </p:cNvCxnSpPr>
+            <p:nvPr/>
+          </p:nvCxnSpPr>
+          <p:spPr>
+            <a:xfrm>
+              <a:off x="4217657" y="1546999"/>
+              <a:ext cx="0" cy="685800"/>
+            </a:xfrm>
+            <a:prstGeom prst="line">
+              <a:avLst/>
+            </a:prstGeom>
+          </p:spPr>
+          <p:style>
+            <a:lnRef idx="1">
+              <a:schemeClr val="accent1"/>
+            </a:lnRef>
+            <a:fillRef idx="0">
+              <a:schemeClr val="accent1"/>
+            </a:fillRef>
+            <a:effectRef idx="0">
+              <a:schemeClr val="accent1"/>
+            </a:effectRef>
+            <a:fontRef idx="minor">
+              <a:schemeClr val="tx1"/>
+            </a:fontRef>
+          </p:style>
+        </p:cxnSp>
+        <p:sp>
+          <p:nvSpPr>
+            <p:cNvPr id="27" name="TextBox 26">
+              <a:extLst>
+                <a:ext uri="{FF2B5EF4-FFF2-40B4-BE49-F238E27FC236}">
+                  <a16:creationId xmlns:a16="http://schemas.microsoft.com/office/drawing/2014/main" id="{4C7200E6-2769-4F3A-99E9-A6B0B7ACDD70}"/>
+                </a:ext>
+              </a:extLst>
+            </p:cNvPr>
+            <p:cNvSpPr txBox="1"/>
+            <p:nvPr/>
+          </p:nvSpPr>
+          <p:spPr>
+            <a:xfrm>
+              <a:off x="3962123" y="1666741"/>
+              <a:ext cx="253440" cy="338554"/>
+            </a:xfrm>
+            <a:prstGeom prst="rect">
+              <a:avLst/>
+            </a:prstGeom>
+            <a:noFill/>
+          </p:spPr>
+          <p:txBody>
+            <a:bodyPr wrap="square" rtlCol="0">
+              <a:spAutoFit/>
+            </a:bodyPr>
+            <a:lstStyle/>
+            <a:p>
+              <a:r>
+                <a:rPr lang="en-US" sz="2400" baseline="-25000" dirty="0"/>
+                <a:t>z</a:t>
+              </a:r>
+            </a:p>
+          </p:txBody>
+        </p:sp>
+        <p:sp>
+          <p:nvSpPr>
+            <p:cNvPr id="28" name="TextBox 27">
+              <a:extLst>
+                <a:ext uri="{FF2B5EF4-FFF2-40B4-BE49-F238E27FC236}">
+                  <a16:creationId xmlns:a16="http://schemas.microsoft.com/office/drawing/2014/main" id="{9051657A-9764-45E2-9BD7-A7F55090049A}"/>
+                </a:ext>
+              </a:extLst>
+            </p:cNvPr>
+            <p:cNvSpPr txBox="1"/>
+            <p:nvPr/>
+          </p:nvSpPr>
+          <p:spPr>
+            <a:xfrm>
+              <a:off x="4216124" y="1666741"/>
+              <a:ext cx="253440" cy="338554"/>
+            </a:xfrm>
+            <a:prstGeom prst="rect">
+              <a:avLst/>
+            </a:prstGeom>
+            <a:noFill/>
+          </p:spPr>
+          <p:txBody>
+            <a:bodyPr wrap="square" rtlCol="0">
+              <a:spAutoFit/>
+            </a:bodyPr>
+            <a:lstStyle/>
+            <a:p>
+              <a:r>
+                <a:rPr lang="en-US" sz="2400" baseline="-25000" dirty="0"/>
+                <a:t>a</a:t>
+              </a:r>
+            </a:p>
+          </p:txBody>
+        </p:sp>
+      </p:grpSp>
+      <p:grpSp>
+        <p:nvGrpSpPr>
+          <p:cNvPr id="29" name="Group 28">
+            <a:extLst>
+              <a:ext uri="{FF2B5EF4-FFF2-40B4-BE49-F238E27FC236}">
+                <a16:creationId xmlns:a16="http://schemas.microsoft.com/office/drawing/2014/main" id="{944861AC-AB10-4518-8277-39676612009C}"/>
+              </a:ext>
+            </a:extLst>
+          </p:cNvPr>
+          <p:cNvGrpSpPr/>
+          <p:nvPr/>
+        </p:nvGrpSpPr>
+        <p:grpSpPr>
+          <a:xfrm>
+            <a:off x="3529898" y="4422901"/>
+            <a:ext cx="685800" cy="685800"/>
+            <a:chOff x="3874757" y="1546999"/>
+            <a:chExt cx="685800" cy="685800"/>
+          </a:xfrm>
+        </p:grpSpPr>
+        <p:sp>
+          <p:nvSpPr>
+            <p:cNvPr id="30" name="Flowchart: Connector 29">
+              <a:extLst>
+                <a:ext uri="{FF2B5EF4-FFF2-40B4-BE49-F238E27FC236}">
+                  <a16:creationId xmlns:a16="http://schemas.microsoft.com/office/drawing/2014/main" id="{2A7315AF-722F-4BD9-9448-8AFC3F750B6D}"/>
+                </a:ext>
+              </a:extLst>
+            </p:cNvPr>
+            <p:cNvSpPr>
+              <a:spLocks noChangeAspect="1"/>
+            </p:cNvSpPr>
+            <p:nvPr/>
+          </p:nvSpPr>
+          <p:spPr>
+            <a:xfrm>
+              <a:off x="3874757" y="1546999"/>
+              <a:ext cx="685800" cy="685800"/>
+            </a:xfrm>
+            <a:prstGeom prst="flowChartConnector">
+              <a:avLst/>
+            </a:prstGeom>
+            <a:noFill/>
+          </p:spPr>
+          <p:style>
+            <a:lnRef idx="2">
+              <a:schemeClr val="accent1">
+                <a:shade val="50000"/>
+              </a:schemeClr>
+            </a:lnRef>
+            <a:fillRef idx="1">
+              <a:schemeClr val="accent1"/>
+            </a:fillRef>
+            <a:effectRef idx="0">
+              <a:schemeClr val="accent1"/>
+            </a:effectRef>
+            <a:fontRef idx="minor">
+              <a:schemeClr val="lt1"/>
+            </a:fontRef>
+          </p:style>
+          <p:txBody>
+            <a:bodyPr rtlCol="0" anchor="ctr"/>
+            <a:lstStyle/>
+            <a:p>
+              <a:pPr algn="ctr"/>
+              <a:endParaRPr lang="en-US" sz="1050" baseline="-25000" dirty="0">
+                <a:solidFill>
+                  <a:schemeClr val="tx1"/>
+                </a:solidFill>
+              </a:endParaRPr>
+            </a:p>
+          </p:txBody>
+        </p:sp>
+        <p:cxnSp>
+          <p:nvCxnSpPr>
+            <p:cNvPr id="31" name="Straight Connector 30">
+              <a:extLst>
+                <a:ext uri="{FF2B5EF4-FFF2-40B4-BE49-F238E27FC236}">
+                  <a16:creationId xmlns:a16="http://schemas.microsoft.com/office/drawing/2014/main" id="{DA6585EB-2981-44AA-B977-AF0254E40E13}"/>
+                </a:ext>
+              </a:extLst>
+            </p:cNvPr>
+            <p:cNvCxnSpPr>
+              <a:stCxn id="30" idx="0"/>
+              <a:endCxn id="30" idx="4"/>
+            </p:cNvCxnSpPr>
+            <p:nvPr/>
+          </p:nvCxnSpPr>
+          <p:spPr>
+            <a:xfrm>
+              <a:off x="4217657" y="1546999"/>
+              <a:ext cx="0" cy="685800"/>
+            </a:xfrm>
+            <a:prstGeom prst="line">
+              <a:avLst/>
+            </a:prstGeom>
+          </p:spPr>
+          <p:style>
+            <a:lnRef idx="1">
+              <a:schemeClr val="accent1"/>
+            </a:lnRef>
+            <a:fillRef idx="0">
+              <a:schemeClr val="accent1"/>
+            </a:fillRef>
+            <a:effectRef idx="0">
+              <a:schemeClr val="accent1"/>
+            </a:effectRef>
+            <a:fontRef idx="minor">
+              <a:schemeClr val="tx1"/>
+            </a:fontRef>
+          </p:style>
+        </p:cxnSp>
+        <p:sp>
+          <p:nvSpPr>
+            <p:cNvPr id="32" name="TextBox 31">
+              <a:extLst>
+                <a:ext uri="{FF2B5EF4-FFF2-40B4-BE49-F238E27FC236}">
+                  <a16:creationId xmlns:a16="http://schemas.microsoft.com/office/drawing/2014/main" id="{B4EBCC6F-95FE-4A24-B570-F45098356CDD}"/>
+                </a:ext>
+              </a:extLst>
+            </p:cNvPr>
+            <p:cNvSpPr txBox="1"/>
+            <p:nvPr/>
+          </p:nvSpPr>
+          <p:spPr>
+            <a:xfrm>
+              <a:off x="3962123" y="1666741"/>
+              <a:ext cx="253440" cy="338554"/>
+            </a:xfrm>
+            <a:prstGeom prst="rect">
+              <a:avLst/>
+            </a:prstGeom>
+            <a:noFill/>
+          </p:spPr>
+          <p:txBody>
+            <a:bodyPr wrap="square" rtlCol="0">
+              <a:spAutoFit/>
+            </a:bodyPr>
+            <a:lstStyle/>
+            <a:p>
+              <a:r>
+                <a:rPr lang="en-US" sz="2400" baseline="-25000" dirty="0"/>
+                <a:t>z</a:t>
+              </a:r>
+            </a:p>
+          </p:txBody>
+        </p:sp>
+        <p:sp>
+          <p:nvSpPr>
+            <p:cNvPr id="33" name="TextBox 32">
+              <a:extLst>
+                <a:ext uri="{FF2B5EF4-FFF2-40B4-BE49-F238E27FC236}">
+                  <a16:creationId xmlns:a16="http://schemas.microsoft.com/office/drawing/2014/main" id="{377BF8F2-1283-46AB-B065-F014A998EA0A}"/>
+                </a:ext>
+              </a:extLst>
+            </p:cNvPr>
+            <p:cNvSpPr txBox="1"/>
+            <p:nvPr/>
+          </p:nvSpPr>
+          <p:spPr>
+            <a:xfrm>
+              <a:off x="4216124" y="1666741"/>
+              <a:ext cx="253440" cy="338554"/>
+            </a:xfrm>
+            <a:prstGeom prst="rect">
+              <a:avLst/>
+            </a:prstGeom>
+            <a:noFill/>
+          </p:spPr>
+          <p:txBody>
+            <a:bodyPr wrap="square" rtlCol="0">
+              <a:spAutoFit/>
+            </a:bodyPr>
+            <a:lstStyle/>
+            <a:p>
+              <a:r>
+                <a:rPr lang="en-US" sz="2400" baseline="-25000" dirty="0"/>
+                <a:t>a</a:t>
+              </a:r>
+            </a:p>
+          </p:txBody>
+        </p:sp>
+      </p:grpSp>
+      <p:sp>
+        <p:nvSpPr>
+          <p:cNvPr id="36" name="Flowchart: Connector 35">
+            <a:extLst>
+              <a:ext uri="{FF2B5EF4-FFF2-40B4-BE49-F238E27FC236}">
+                <a16:creationId xmlns:a16="http://schemas.microsoft.com/office/drawing/2014/main" id="{43A1A974-4FFB-498D-A78D-2EFF19F51A76}"/>
+              </a:ext>
+            </a:extLst>
+          </p:cNvPr>
+          <p:cNvSpPr>
+            <a:spLocks noChangeAspect="1"/>
+          </p:cNvSpPr>
+          <p:nvPr/>
+        </p:nvSpPr>
+        <p:spPr>
+          <a:xfrm>
+            <a:off x="3627168" y="5525785"/>
+            <a:ext cx="457200" cy="457200"/>
+          </a:xfrm>
+          <a:prstGeom prst="flowChartConnector">
+            <a:avLst/>
+          </a:prstGeom>
+          <a:noFill/>
+        </p:spPr>
+        <p:style>
+          <a:lnRef idx="2">
+            <a:schemeClr val="accent1">
+              <a:shade val="50000"/>
+            </a:schemeClr>
+          </a:lnRef>
+          <a:fillRef idx="1">
+            <a:schemeClr val="accent1"/>
+          </a:fillRef>
+          <a:effectRef idx="0">
+            <a:schemeClr val="accent1"/>
+          </a:effectRef>
+          <a:fontRef idx="minor">
+            <a:schemeClr val="lt1"/>
+          </a:fontRef>
+        </p:style>
+        <p:txBody>
+          <a:bodyPr rtlCol="0" anchor="ctr"/>
+          <a:lstStyle/>
+          <a:p>
+            <a:pPr algn="ctr"/>
+            <a:r>
+              <a:rPr lang="en-US" sz="1050" dirty="0">
+                <a:solidFill>
+                  <a:schemeClr val="tx1"/>
+                </a:solidFill>
+              </a:rPr>
+              <a:t>b</a:t>
+            </a:r>
+            <a:r>
+              <a:rPr lang="en-US" sz="1050" baseline="-25000" dirty="0">
+                <a:solidFill>
+                  <a:schemeClr val="tx1"/>
+                </a:solidFill>
+              </a:rPr>
+              <a:t>2</a:t>
+            </a:r>
+          </a:p>
+        </p:txBody>
+      </p:sp>
+      <p:sp>
+        <p:nvSpPr>
+          <p:cNvPr id="86" name="TextBox 85">
+            <a:extLst>
+              <a:ext uri="{FF2B5EF4-FFF2-40B4-BE49-F238E27FC236}">
+                <a16:creationId xmlns:a16="http://schemas.microsoft.com/office/drawing/2014/main" id="{EA607980-33CC-403D-AFBE-F6E4E00CCEA1}"/>
+              </a:ext>
+            </a:extLst>
+          </p:cNvPr>
+          <p:cNvSpPr txBox="1"/>
+          <p:nvPr/>
+        </p:nvSpPr>
+        <p:spPr>
+          <a:xfrm>
+            <a:off x="3001765" y="1437561"/>
+            <a:ext cx="506675" cy="276999"/>
+          </a:xfrm>
+          <a:prstGeom prst="rect">
+            <a:avLst/>
+          </a:prstGeom>
+          <a:noFill/>
+        </p:spPr>
+        <p:txBody>
+          <a:bodyPr wrap="square" rtlCol="0">
+            <a:spAutoFit/>
+          </a:bodyPr>
+          <a:lstStyle/>
+          <a:p>
+            <a:r>
+              <a:rPr lang="en-US" sz="1200" b="1" dirty="0"/>
+              <a:t>w</a:t>
+            </a:r>
+            <a:r>
+              <a:rPr lang="en-US" sz="1200" b="1" baseline="-25000" dirty="0"/>
+              <a:t>1</a:t>
+            </a:r>
+          </a:p>
+        </p:txBody>
+      </p:sp>
+      <p:sp>
+        <p:nvSpPr>
+          <p:cNvPr id="89" name="TextBox 88">
+            <a:extLst>
+              <a:ext uri="{FF2B5EF4-FFF2-40B4-BE49-F238E27FC236}">
+                <a16:creationId xmlns:a16="http://schemas.microsoft.com/office/drawing/2014/main" id="{7174217D-1D2F-48A8-B906-9135E58CE030}"/>
+              </a:ext>
+            </a:extLst>
+          </p:cNvPr>
+          <p:cNvSpPr txBox="1"/>
+          <p:nvPr/>
+        </p:nvSpPr>
+        <p:spPr>
+          <a:xfrm>
+            <a:off x="3001765" y="1795983"/>
+            <a:ext cx="506675" cy="276999"/>
+          </a:xfrm>
+          <a:prstGeom prst="rect">
+            <a:avLst/>
+          </a:prstGeom>
+          <a:noFill/>
+        </p:spPr>
+        <p:txBody>
+          <a:bodyPr wrap="square" rtlCol="0">
+            <a:spAutoFit/>
+          </a:bodyPr>
+          <a:lstStyle/>
+          <a:p>
+            <a:r>
+              <a:rPr lang="en-US" sz="1200" b="1" dirty="0"/>
+              <a:t>w</a:t>
+            </a:r>
+            <a:r>
+              <a:rPr lang="en-US" sz="1200" b="1" baseline="-25000" dirty="0"/>
+              <a:t>2</a:t>
+            </a:r>
+          </a:p>
+        </p:txBody>
+      </p:sp>
+      <p:sp>
+        <p:nvSpPr>
+          <p:cNvPr id="90" name="TextBox 89">
+            <a:extLst>
+              <a:ext uri="{FF2B5EF4-FFF2-40B4-BE49-F238E27FC236}">
+                <a16:creationId xmlns:a16="http://schemas.microsoft.com/office/drawing/2014/main" id="{60E9C04B-7C18-488D-8F0D-7DFFC1309F84}"/>
+              </a:ext>
+            </a:extLst>
+          </p:cNvPr>
+          <p:cNvSpPr txBox="1"/>
+          <p:nvPr/>
+        </p:nvSpPr>
+        <p:spPr>
+          <a:xfrm>
+            <a:off x="3001765" y="2366089"/>
+            <a:ext cx="506675" cy="276999"/>
+          </a:xfrm>
+          <a:prstGeom prst="rect">
+            <a:avLst/>
+          </a:prstGeom>
+          <a:noFill/>
+        </p:spPr>
+        <p:txBody>
+          <a:bodyPr wrap="square" rtlCol="0">
+            <a:spAutoFit/>
+          </a:bodyPr>
+          <a:lstStyle/>
+          <a:p>
+            <a:r>
+              <a:rPr lang="en-US" sz="1200" b="1" dirty="0"/>
+              <a:t>w</a:t>
+            </a:r>
+            <a:r>
+              <a:rPr lang="en-US" sz="1200" b="1" baseline="-25000" dirty="0"/>
+              <a:t>3</a:t>
+            </a:r>
+          </a:p>
+        </p:txBody>
+      </p:sp>
+      <p:sp>
+        <p:nvSpPr>
+          <p:cNvPr id="93" name="TextBox 92">
+            <a:extLst>
+              <a:ext uri="{FF2B5EF4-FFF2-40B4-BE49-F238E27FC236}">
+                <a16:creationId xmlns:a16="http://schemas.microsoft.com/office/drawing/2014/main" id="{D62256FA-00C4-4610-AF1D-8AA5E3788B18}"/>
+              </a:ext>
+            </a:extLst>
+          </p:cNvPr>
+          <p:cNvSpPr txBox="1"/>
+          <p:nvPr/>
+        </p:nvSpPr>
+        <p:spPr>
+          <a:xfrm>
+            <a:off x="3001765" y="2628329"/>
+            <a:ext cx="506675" cy="276999"/>
+          </a:xfrm>
+          <a:prstGeom prst="rect">
+            <a:avLst/>
+          </a:prstGeom>
+          <a:noFill/>
+        </p:spPr>
+        <p:txBody>
+          <a:bodyPr wrap="square" rtlCol="0">
+            <a:spAutoFit/>
+          </a:bodyPr>
+          <a:lstStyle/>
+          <a:p>
+            <a:r>
+              <a:rPr lang="en-US" sz="1200" b="1" dirty="0"/>
+              <a:t>w</a:t>
+            </a:r>
+            <a:r>
+              <a:rPr lang="en-US" sz="1200" b="1" baseline="-25000" dirty="0"/>
+              <a:t>4</a:t>
+            </a:r>
+          </a:p>
+        </p:txBody>
+      </p:sp>
+      <p:sp>
+        <p:nvSpPr>
+          <p:cNvPr id="96" name="TextBox 95">
+            <a:extLst>
+              <a:ext uri="{FF2B5EF4-FFF2-40B4-BE49-F238E27FC236}">
+                <a16:creationId xmlns:a16="http://schemas.microsoft.com/office/drawing/2014/main" id="{D46D4896-FC90-4EE6-8709-1EE043A4209C}"/>
+              </a:ext>
+            </a:extLst>
+          </p:cNvPr>
+          <p:cNvSpPr txBox="1"/>
+          <p:nvPr/>
+        </p:nvSpPr>
+        <p:spPr>
+          <a:xfrm>
+            <a:off x="3001765" y="3797242"/>
+            <a:ext cx="506675" cy="276999"/>
+          </a:xfrm>
+          <a:prstGeom prst="rect">
+            <a:avLst/>
+          </a:prstGeom>
+          <a:noFill/>
+        </p:spPr>
+        <p:txBody>
+          <a:bodyPr wrap="square" rtlCol="0">
+            <a:spAutoFit/>
+          </a:bodyPr>
+          <a:lstStyle/>
+          <a:p>
+            <a:r>
+              <a:rPr lang="en-US" sz="1200" b="1" dirty="0"/>
+              <a:t>w</a:t>
+            </a:r>
+            <a:r>
+              <a:rPr lang="en-US" sz="1200" b="1" baseline="-25000" dirty="0"/>
+              <a:t>7</a:t>
+            </a:r>
+          </a:p>
+        </p:txBody>
+      </p:sp>
+      <p:grpSp>
+        <p:nvGrpSpPr>
+          <p:cNvPr id="55" name="Group 54">
+            <a:extLst>
+              <a:ext uri="{FF2B5EF4-FFF2-40B4-BE49-F238E27FC236}">
+                <a16:creationId xmlns:a16="http://schemas.microsoft.com/office/drawing/2014/main" id="{2E9C1066-D4AB-43E8-A609-69799D7188BE}"/>
+              </a:ext>
+            </a:extLst>
+          </p:cNvPr>
+          <p:cNvGrpSpPr/>
+          <p:nvPr/>
+        </p:nvGrpSpPr>
+        <p:grpSpPr>
+          <a:xfrm>
+            <a:off x="5185893" y="2884150"/>
+            <a:ext cx="685800" cy="685800"/>
+            <a:chOff x="3874757" y="1546999"/>
+            <a:chExt cx="685800" cy="685800"/>
+          </a:xfrm>
+        </p:grpSpPr>
+        <p:sp>
+          <p:nvSpPr>
+            <p:cNvPr id="56" name="Flowchart: Connector 55">
+              <a:extLst>
+                <a:ext uri="{FF2B5EF4-FFF2-40B4-BE49-F238E27FC236}">
+                  <a16:creationId xmlns:a16="http://schemas.microsoft.com/office/drawing/2014/main" id="{07FAA07D-C462-49F5-9C08-92E4E3E76853}"/>
+                </a:ext>
+              </a:extLst>
+            </p:cNvPr>
+            <p:cNvSpPr>
+              <a:spLocks noChangeAspect="1"/>
+            </p:cNvSpPr>
+            <p:nvPr/>
+          </p:nvSpPr>
+          <p:spPr>
+            <a:xfrm>
+              <a:off x="3874757" y="1546999"/>
+              <a:ext cx="685800" cy="685800"/>
+            </a:xfrm>
+            <a:prstGeom prst="flowChartConnector">
+              <a:avLst/>
+            </a:prstGeom>
+            <a:noFill/>
+          </p:spPr>
+          <p:style>
+            <a:lnRef idx="2">
+              <a:schemeClr val="accent1">
+                <a:shade val="50000"/>
+              </a:schemeClr>
+            </a:lnRef>
+            <a:fillRef idx="1">
+              <a:schemeClr val="accent1"/>
+            </a:fillRef>
+            <a:effectRef idx="0">
+              <a:schemeClr val="accent1"/>
+            </a:effectRef>
+            <a:fontRef idx="minor">
+              <a:schemeClr val="lt1"/>
+            </a:fontRef>
+          </p:style>
+          <p:txBody>
+            <a:bodyPr rtlCol="0" anchor="ctr"/>
+            <a:lstStyle/>
+            <a:p>
+              <a:pPr algn="ctr"/>
+              <a:endParaRPr lang="en-US" sz="1050" baseline="-25000" dirty="0">
+                <a:solidFill>
+                  <a:schemeClr val="tx1"/>
+                </a:solidFill>
+              </a:endParaRPr>
+            </a:p>
+          </p:txBody>
+        </p:sp>
+        <p:cxnSp>
+          <p:nvCxnSpPr>
+            <p:cNvPr id="57" name="Straight Connector 56">
+              <a:extLst>
+                <a:ext uri="{FF2B5EF4-FFF2-40B4-BE49-F238E27FC236}">
+                  <a16:creationId xmlns:a16="http://schemas.microsoft.com/office/drawing/2014/main" id="{655EFC28-59BA-44FA-AC25-F9FECCD85B8A}"/>
+                </a:ext>
+              </a:extLst>
+            </p:cNvPr>
+            <p:cNvCxnSpPr>
+              <a:stCxn id="56" idx="0"/>
+              <a:endCxn id="56" idx="4"/>
+            </p:cNvCxnSpPr>
+            <p:nvPr/>
+          </p:nvCxnSpPr>
+          <p:spPr>
+            <a:xfrm>
+              <a:off x="4217657" y="1546999"/>
+              <a:ext cx="0" cy="685800"/>
+            </a:xfrm>
+            <a:prstGeom prst="line">
+              <a:avLst/>
+            </a:prstGeom>
+          </p:spPr>
+          <p:style>
+            <a:lnRef idx="1">
+              <a:schemeClr val="accent1"/>
+            </a:lnRef>
+            <a:fillRef idx="0">
+              <a:schemeClr val="accent1"/>
+            </a:fillRef>
+            <a:effectRef idx="0">
+              <a:schemeClr val="accent1"/>
+            </a:effectRef>
+            <a:fontRef idx="minor">
+              <a:schemeClr val="tx1"/>
+            </a:fontRef>
+          </p:style>
+        </p:cxnSp>
+        <p:sp>
+          <p:nvSpPr>
+            <p:cNvPr id="58" name="TextBox 57">
+              <a:extLst>
+                <a:ext uri="{FF2B5EF4-FFF2-40B4-BE49-F238E27FC236}">
+                  <a16:creationId xmlns:a16="http://schemas.microsoft.com/office/drawing/2014/main" id="{9BFE6E3B-8D43-4A4E-93A6-5805ACA4C729}"/>
+                </a:ext>
+              </a:extLst>
+            </p:cNvPr>
+            <p:cNvSpPr txBox="1"/>
+            <p:nvPr/>
+          </p:nvSpPr>
+          <p:spPr>
+            <a:xfrm>
+              <a:off x="3962123" y="1666741"/>
+              <a:ext cx="253440" cy="338554"/>
+            </a:xfrm>
+            <a:prstGeom prst="rect">
+              <a:avLst/>
+            </a:prstGeom>
+            <a:noFill/>
+          </p:spPr>
+          <p:txBody>
+            <a:bodyPr wrap="square" rtlCol="0">
+              <a:spAutoFit/>
+            </a:bodyPr>
+            <a:lstStyle/>
+            <a:p>
+              <a:r>
+                <a:rPr lang="en-US" sz="2400" baseline="-25000" dirty="0"/>
+                <a:t>z</a:t>
+              </a:r>
+            </a:p>
+          </p:txBody>
+        </p:sp>
+        <p:sp>
+          <p:nvSpPr>
+            <p:cNvPr id="60" name="TextBox 59">
+              <a:extLst>
+                <a:ext uri="{FF2B5EF4-FFF2-40B4-BE49-F238E27FC236}">
+                  <a16:creationId xmlns:a16="http://schemas.microsoft.com/office/drawing/2014/main" id="{BE6B56A2-10CA-4AF8-8EC7-48CABF7F60DF}"/>
+                </a:ext>
+              </a:extLst>
+            </p:cNvPr>
+            <p:cNvSpPr txBox="1"/>
+            <p:nvPr/>
+          </p:nvSpPr>
+          <p:spPr>
+            <a:xfrm>
+              <a:off x="4216124" y="1666741"/>
+              <a:ext cx="253440" cy="338554"/>
+            </a:xfrm>
+            <a:prstGeom prst="rect">
+              <a:avLst/>
+            </a:prstGeom>
+            <a:noFill/>
+          </p:spPr>
+          <p:txBody>
+            <a:bodyPr wrap="square" rtlCol="0">
+              <a:spAutoFit/>
+            </a:bodyPr>
+            <a:lstStyle/>
+            <a:p>
+              <a:r>
+                <a:rPr lang="en-US" sz="2400" baseline="-25000" dirty="0"/>
+                <a:t>a</a:t>
+              </a:r>
+            </a:p>
+          </p:txBody>
+        </p:sp>
+      </p:grpSp>
+      <p:cxnSp>
+        <p:nvCxnSpPr>
+          <p:cNvPr id="37" name="Straight Arrow Connector 36">
+            <a:extLst>
+              <a:ext uri="{FF2B5EF4-FFF2-40B4-BE49-F238E27FC236}">
+                <a16:creationId xmlns:a16="http://schemas.microsoft.com/office/drawing/2014/main" id="{BDB6E7AE-CEEA-437C-B322-322F60E922E2}"/>
+              </a:ext>
+            </a:extLst>
+          </p:cNvPr>
+          <p:cNvCxnSpPr>
+            <a:stCxn id="4" idx="6"/>
+            <a:endCxn id="7" idx="2"/>
+          </p:cNvCxnSpPr>
+          <p:nvPr/>
+        </p:nvCxnSpPr>
+        <p:spPr>
+          <a:xfrm flipV="1">
+            <a:off x="2303585" y="1504571"/>
+            <a:ext cx="1226313" cy="1087077"/>
+          </a:xfrm>
+          <a:prstGeom prst="straightConnector1">
+            <a:avLst/>
+          </a:prstGeom>
+          <a:ln>
+            <a:tailEnd type="triangle"/>
+          </a:ln>
+        </p:spPr>
+        <p:style>
+          <a:lnRef idx="1">
+            <a:schemeClr val="accent1"/>
+          </a:lnRef>
+          <a:fillRef idx="0">
+            <a:schemeClr val="accent1"/>
+          </a:fillRef>
+          <a:effectRef idx="0">
+            <a:schemeClr val="accent1"/>
+          </a:effectRef>
+          <a:fontRef idx="minor">
+            <a:schemeClr val="tx1"/>
+          </a:fontRef>
+        </p:style>
+      </p:cxnSp>
+      <p:cxnSp>
+        <p:nvCxnSpPr>
+          <p:cNvPr id="40" name="Straight Arrow Connector 39">
+            <a:extLst>
+              <a:ext uri="{FF2B5EF4-FFF2-40B4-BE49-F238E27FC236}">
+                <a16:creationId xmlns:a16="http://schemas.microsoft.com/office/drawing/2014/main" id="{862AD22D-A7BA-4957-B106-C210957883DE}"/>
+              </a:ext>
+            </a:extLst>
+          </p:cNvPr>
+          <p:cNvCxnSpPr>
+            <a:cxnSpLocks/>
+            <a:stCxn id="4" idx="6"/>
+            <a:endCxn id="15" idx="2"/>
+          </p:cNvCxnSpPr>
+          <p:nvPr/>
+        </p:nvCxnSpPr>
+        <p:spPr>
+          <a:xfrm>
+            <a:off x="2303585" y="2591648"/>
+            <a:ext cx="1226313" cy="0"/>
+          </a:xfrm>
+          <a:prstGeom prst="straightConnector1">
+            <a:avLst/>
+          </a:prstGeom>
+          <a:ln>
+            <a:tailEnd type="triangle"/>
+          </a:ln>
+        </p:spPr>
+        <p:style>
+          <a:lnRef idx="1">
+            <a:schemeClr val="accent1"/>
+          </a:lnRef>
+          <a:fillRef idx="0">
+            <a:schemeClr val="accent1"/>
+          </a:fillRef>
+          <a:effectRef idx="0">
+            <a:schemeClr val="accent1"/>
+          </a:effectRef>
+          <a:fontRef idx="minor">
+            <a:schemeClr val="tx1"/>
+          </a:fontRef>
+        </p:style>
+      </p:cxnSp>
+      <p:cxnSp>
+        <p:nvCxnSpPr>
+          <p:cNvPr id="45" name="Straight Arrow Connector 44">
+            <a:extLst>
+              <a:ext uri="{FF2B5EF4-FFF2-40B4-BE49-F238E27FC236}">
+                <a16:creationId xmlns:a16="http://schemas.microsoft.com/office/drawing/2014/main" id="{AFDE77C8-1D1E-46A9-91D6-F5BD119013F7}"/>
+              </a:ext>
+            </a:extLst>
+          </p:cNvPr>
+          <p:cNvCxnSpPr>
+            <a:stCxn id="4" idx="6"/>
+            <a:endCxn id="25" idx="2"/>
+          </p:cNvCxnSpPr>
+          <p:nvPr/>
+        </p:nvCxnSpPr>
+        <p:spPr>
+          <a:xfrm>
+            <a:off x="2303585" y="2591648"/>
+            <a:ext cx="1226313" cy="1087077"/>
+          </a:xfrm>
+          <a:prstGeom prst="straightConnector1">
+            <a:avLst/>
+          </a:prstGeom>
+          <a:ln>
+            <a:tailEnd type="triangle"/>
+          </a:ln>
+        </p:spPr>
+        <p:style>
+          <a:lnRef idx="1">
+            <a:schemeClr val="accent1"/>
+          </a:lnRef>
+          <a:fillRef idx="0">
+            <a:schemeClr val="accent1"/>
+          </a:fillRef>
+          <a:effectRef idx="0">
+            <a:schemeClr val="accent1"/>
+          </a:effectRef>
+          <a:fontRef idx="minor">
+            <a:schemeClr val="tx1"/>
+          </a:fontRef>
+        </p:style>
+      </p:cxnSp>
+      <p:cxnSp>
+        <p:nvCxnSpPr>
+          <p:cNvPr id="47" name="Straight Arrow Connector 46">
+            <a:extLst>
+              <a:ext uri="{FF2B5EF4-FFF2-40B4-BE49-F238E27FC236}">
+                <a16:creationId xmlns:a16="http://schemas.microsoft.com/office/drawing/2014/main" id="{9AFEF0A2-96E2-4748-BCC7-483029047785}"/>
+              </a:ext>
+            </a:extLst>
+          </p:cNvPr>
+          <p:cNvCxnSpPr>
+            <a:stCxn id="4" idx="6"/>
+            <a:endCxn id="30" idx="2"/>
+          </p:cNvCxnSpPr>
+          <p:nvPr/>
+        </p:nvCxnSpPr>
+        <p:spPr>
+          <a:xfrm>
+            <a:off x="2303585" y="2591648"/>
+            <a:ext cx="1226313" cy="2174153"/>
+          </a:xfrm>
+          <a:prstGeom prst="straightConnector1">
+            <a:avLst/>
+          </a:prstGeom>
+          <a:ln>
+            <a:tailEnd type="triangle"/>
+          </a:ln>
+        </p:spPr>
+        <p:style>
+          <a:lnRef idx="1">
+            <a:schemeClr val="accent1"/>
+          </a:lnRef>
+          <a:fillRef idx="0">
+            <a:schemeClr val="accent1"/>
+          </a:fillRef>
+          <a:effectRef idx="0">
+            <a:schemeClr val="accent1"/>
+          </a:effectRef>
+          <a:fontRef idx="minor">
+            <a:schemeClr val="tx1"/>
+          </a:fontRef>
+        </p:style>
+      </p:cxnSp>
+      <p:cxnSp>
+        <p:nvCxnSpPr>
+          <p:cNvPr id="51" name="Straight Arrow Connector 50">
+            <a:extLst>
+              <a:ext uri="{FF2B5EF4-FFF2-40B4-BE49-F238E27FC236}">
+                <a16:creationId xmlns:a16="http://schemas.microsoft.com/office/drawing/2014/main" id="{29BB722D-0940-4605-BFDD-95F5AC388D33}"/>
+              </a:ext>
+            </a:extLst>
+          </p:cNvPr>
+          <p:cNvCxnSpPr>
+            <a:stCxn id="5" idx="6"/>
+            <a:endCxn id="7" idx="2"/>
+          </p:cNvCxnSpPr>
+          <p:nvPr/>
+        </p:nvCxnSpPr>
+        <p:spPr>
+          <a:xfrm flipV="1">
+            <a:off x="2303585" y="1504571"/>
+            <a:ext cx="1226313" cy="2174154"/>
+          </a:xfrm>
+          <a:prstGeom prst="straightConnector1">
+            <a:avLst/>
+          </a:prstGeom>
+          <a:ln>
+            <a:tailEnd type="triangle"/>
+          </a:ln>
+        </p:spPr>
+        <p:style>
+          <a:lnRef idx="1">
+            <a:schemeClr val="accent1"/>
+          </a:lnRef>
+          <a:fillRef idx="0">
+            <a:schemeClr val="accent1"/>
+          </a:fillRef>
+          <a:effectRef idx="0">
+            <a:schemeClr val="accent1"/>
+          </a:effectRef>
+          <a:fontRef idx="minor">
+            <a:schemeClr val="tx1"/>
+          </a:fontRef>
+        </p:style>
+      </p:cxnSp>
+      <p:cxnSp>
+        <p:nvCxnSpPr>
+          <p:cNvPr id="53" name="Straight Arrow Connector 52">
+            <a:extLst>
+              <a:ext uri="{FF2B5EF4-FFF2-40B4-BE49-F238E27FC236}">
+                <a16:creationId xmlns:a16="http://schemas.microsoft.com/office/drawing/2014/main" id="{A430B5C2-659F-45EB-A34A-B3558E627ACD}"/>
+              </a:ext>
+            </a:extLst>
+          </p:cNvPr>
+          <p:cNvCxnSpPr>
+            <a:stCxn id="5" idx="6"/>
+            <a:endCxn id="15" idx="2"/>
+          </p:cNvCxnSpPr>
+          <p:nvPr/>
+        </p:nvCxnSpPr>
+        <p:spPr>
+          <a:xfrm flipV="1">
+            <a:off x="2303585" y="2591648"/>
+            <a:ext cx="1226313" cy="1087077"/>
+          </a:xfrm>
+          <a:prstGeom prst="straightConnector1">
+            <a:avLst/>
+          </a:prstGeom>
+          <a:ln>
+            <a:tailEnd type="triangle"/>
+          </a:ln>
+        </p:spPr>
+        <p:style>
+          <a:lnRef idx="1">
+            <a:schemeClr val="accent1"/>
+          </a:lnRef>
+          <a:fillRef idx="0">
+            <a:schemeClr val="accent1"/>
+          </a:fillRef>
+          <a:effectRef idx="0">
+            <a:schemeClr val="accent1"/>
+          </a:effectRef>
+          <a:fontRef idx="minor">
+            <a:schemeClr val="tx1"/>
+          </a:fontRef>
+        </p:style>
+      </p:cxnSp>
+      <p:cxnSp>
+        <p:nvCxnSpPr>
+          <p:cNvPr id="64" name="Straight Arrow Connector 63">
+            <a:extLst>
+              <a:ext uri="{FF2B5EF4-FFF2-40B4-BE49-F238E27FC236}">
+                <a16:creationId xmlns:a16="http://schemas.microsoft.com/office/drawing/2014/main" id="{C09A53E2-F206-465D-8C41-562D1F6E4DCC}"/>
+              </a:ext>
+            </a:extLst>
+          </p:cNvPr>
+          <p:cNvCxnSpPr>
+            <a:stCxn id="5" idx="6"/>
+            <a:endCxn id="25" idx="2"/>
+          </p:cNvCxnSpPr>
+          <p:nvPr/>
+        </p:nvCxnSpPr>
+        <p:spPr>
+          <a:xfrm>
+            <a:off x="2303585" y="3678725"/>
+            <a:ext cx="1226313" cy="0"/>
+          </a:xfrm>
+          <a:prstGeom prst="straightConnector1">
+            <a:avLst/>
+          </a:prstGeom>
+          <a:ln>
+            <a:tailEnd type="triangle"/>
+          </a:ln>
+        </p:spPr>
+        <p:style>
+          <a:lnRef idx="1">
+            <a:schemeClr val="accent1"/>
+          </a:lnRef>
+          <a:fillRef idx="0">
+            <a:schemeClr val="accent1"/>
+          </a:fillRef>
+          <a:effectRef idx="0">
+            <a:schemeClr val="accent1"/>
+          </a:effectRef>
+          <a:fontRef idx="minor">
+            <a:schemeClr val="tx1"/>
+          </a:fontRef>
+        </p:style>
+      </p:cxnSp>
+      <p:cxnSp>
+        <p:nvCxnSpPr>
+          <p:cNvPr id="66" name="Straight Arrow Connector 65">
+            <a:extLst>
+              <a:ext uri="{FF2B5EF4-FFF2-40B4-BE49-F238E27FC236}">
+                <a16:creationId xmlns:a16="http://schemas.microsoft.com/office/drawing/2014/main" id="{CF0D97B7-D104-45BC-9087-E4C8F088032D}"/>
+              </a:ext>
+            </a:extLst>
+          </p:cNvPr>
+          <p:cNvCxnSpPr>
+            <a:stCxn id="5" idx="6"/>
+            <a:endCxn id="30" idx="2"/>
+          </p:cNvCxnSpPr>
+          <p:nvPr/>
+        </p:nvCxnSpPr>
+        <p:spPr>
+          <a:xfrm>
+            <a:off x="2303585" y="3678725"/>
+            <a:ext cx="1226313" cy="1087076"/>
+          </a:xfrm>
+          <a:prstGeom prst="straightConnector1">
+            <a:avLst/>
+          </a:prstGeom>
+          <a:ln>
+            <a:tailEnd type="triangle"/>
+          </a:ln>
+        </p:spPr>
+        <p:style>
+          <a:lnRef idx="1">
+            <a:schemeClr val="accent1"/>
+          </a:lnRef>
+          <a:fillRef idx="0">
+            <a:schemeClr val="accent1"/>
+          </a:fillRef>
+          <a:effectRef idx="0">
+            <a:schemeClr val="accent1"/>
+          </a:effectRef>
+          <a:fontRef idx="minor">
+            <a:schemeClr val="tx1"/>
+          </a:fontRef>
+        </p:style>
+      </p:cxnSp>
+      <p:sp>
+        <p:nvSpPr>
+          <p:cNvPr id="98" name="TextBox 97">
+            <a:extLst>
+              <a:ext uri="{FF2B5EF4-FFF2-40B4-BE49-F238E27FC236}">
+                <a16:creationId xmlns:a16="http://schemas.microsoft.com/office/drawing/2014/main" id="{AB857C19-7F4E-49E9-8514-A529233D97D0}"/>
+              </a:ext>
+            </a:extLst>
+          </p:cNvPr>
+          <p:cNvSpPr txBox="1"/>
+          <p:nvPr/>
+        </p:nvSpPr>
+        <p:spPr>
+          <a:xfrm>
+            <a:off x="3001765" y="3107782"/>
+            <a:ext cx="506675" cy="276999"/>
+          </a:xfrm>
+          <a:prstGeom prst="rect">
+            <a:avLst/>
+          </a:prstGeom>
+          <a:noFill/>
+        </p:spPr>
+        <p:txBody>
+          <a:bodyPr wrap="square" rtlCol="0">
+            <a:spAutoFit/>
+          </a:bodyPr>
+          <a:lstStyle/>
+          <a:p>
+            <a:r>
+              <a:rPr lang="en-US" sz="1200" b="1" dirty="0"/>
+              <a:t>w</a:t>
+            </a:r>
+            <a:r>
+              <a:rPr lang="en-US" sz="1200" b="1" baseline="-25000" dirty="0"/>
+              <a:t>5</a:t>
+            </a:r>
+          </a:p>
+        </p:txBody>
+      </p:sp>
+      <p:sp>
+        <p:nvSpPr>
+          <p:cNvPr id="100" name="TextBox 99">
+            <a:extLst>
+              <a:ext uri="{FF2B5EF4-FFF2-40B4-BE49-F238E27FC236}">
+                <a16:creationId xmlns:a16="http://schemas.microsoft.com/office/drawing/2014/main" id="{3EAA4F6D-6BE9-4E12-AD69-5ECB48780946}"/>
+              </a:ext>
+            </a:extLst>
+          </p:cNvPr>
+          <p:cNvSpPr txBox="1"/>
+          <p:nvPr/>
+        </p:nvSpPr>
+        <p:spPr>
+          <a:xfrm>
+            <a:off x="3001765" y="3431451"/>
+            <a:ext cx="506675" cy="276999"/>
+          </a:xfrm>
+          <a:prstGeom prst="rect">
+            <a:avLst/>
+          </a:prstGeom>
+          <a:noFill/>
+        </p:spPr>
+        <p:txBody>
+          <a:bodyPr wrap="square" rtlCol="0">
+            <a:spAutoFit/>
+          </a:bodyPr>
+          <a:lstStyle/>
+          <a:p>
+            <a:r>
+              <a:rPr lang="en-US" sz="1200" b="1" dirty="0"/>
+              <a:t>w</a:t>
+            </a:r>
+            <a:r>
+              <a:rPr lang="en-US" sz="1200" b="1" baseline="-25000" dirty="0"/>
+              <a:t>6</a:t>
+            </a:r>
+          </a:p>
+        </p:txBody>
+      </p:sp>
+      <p:sp>
+        <p:nvSpPr>
+          <p:cNvPr id="101" name="TextBox 100">
+            <a:extLst>
+              <a:ext uri="{FF2B5EF4-FFF2-40B4-BE49-F238E27FC236}">
+                <a16:creationId xmlns:a16="http://schemas.microsoft.com/office/drawing/2014/main" id="{D4BF0B98-061E-4F74-8B63-EC6817636511}"/>
+              </a:ext>
+            </a:extLst>
+          </p:cNvPr>
+          <p:cNvSpPr txBox="1"/>
+          <p:nvPr/>
+        </p:nvSpPr>
+        <p:spPr>
+          <a:xfrm>
+            <a:off x="3001765" y="4162719"/>
+            <a:ext cx="506675" cy="276999"/>
+          </a:xfrm>
+          <a:prstGeom prst="rect">
+            <a:avLst/>
+          </a:prstGeom>
+          <a:noFill/>
+        </p:spPr>
+        <p:txBody>
+          <a:bodyPr wrap="square" rtlCol="0">
+            <a:spAutoFit/>
+          </a:bodyPr>
+          <a:lstStyle/>
+          <a:p>
+            <a:r>
+              <a:rPr lang="en-US" sz="1200" b="1" dirty="0"/>
+              <a:t>w</a:t>
+            </a:r>
+            <a:r>
+              <a:rPr lang="en-US" sz="1200" b="1" baseline="-25000" dirty="0"/>
+              <a:t>8</a:t>
+            </a:r>
+          </a:p>
+        </p:txBody>
+      </p:sp>
+      <p:cxnSp>
+        <p:nvCxnSpPr>
+          <p:cNvPr id="81" name="Straight Connector 80">
+            <a:extLst>
+              <a:ext uri="{FF2B5EF4-FFF2-40B4-BE49-F238E27FC236}">
+                <a16:creationId xmlns:a16="http://schemas.microsoft.com/office/drawing/2014/main" id="{C058BA8F-377F-42C6-BE75-D60FA47F67C7}"/>
+              </a:ext>
+            </a:extLst>
+          </p:cNvPr>
+          <p:cNvCxnSpPr>
+            <a:cxnSpLocks/>
+            <a:stCxn id="6" idx="6"/>
+            <a:endCxn id="86" idx="3"/>
+          </p:cNvCxnSpPr>
+          <p:nvPr/>
+        </p:nvCxnSpPr>
+        <p:spPr>
+          <a:xfrm flipV="1">
+            <a:off x="2303585" y="1576061"/>
+            <a:ext cx="1204855" cy="3189740"/>
+          </a:xfrm>
+          <a:prstGeom prst="line">
+            <a:avLst/>
+          </a:prstGeom>
+          <a:ln>
+            <a:solidFill>
+              <a:schemeClr val="tx1"/>
+            </a:solidFill>
+            <a:prstDash val="dash"/>
+          </a:ln>
+        </p:spPr>
+        <p:style>
+          <a:lnRef idx="1">
+            <a:schemeClr val="accent1"/>
+          </a:lnRef>
+          <a:fillRef idx="0">
+            <a:schemeClr val="accent1"/>
+          </a:fillRef>
+          <a:effectRef idx="0">
+            <a:schemeClr val="accent1"/>
+          </a:effectRef>
+          <a:fontRef idx="minor">
+            <a:schemeClr val="tx1"/>
+          </a:fontRef>
+        </p:style>
+      </p:cxnSp>
+      <p:cxnSp>
+        <p:nvCxnSpPr>
+          <p:cNvPr id="84" name="Straight Connector 83">
+            <a:extLst>
+              <a:ext uri="{FF2B5EF4-FFF2-40B4-BE49-F238E27FC236}">
+                <a16:creationId xmlns:a16="http://schemas.microsoft.com/office/drawing/2014/main" id="{D33896DB-0491-41E4-9B1D-A023F3452D24}"/>
+              </a:ext>
+            </a:extLst>
+          </p:cNvPr>
+          <p:cNvCxnSpPr>
+            <a:cxnSpLocks/>
+            <a:stCxn id="6" idx="6"/>
+          </p:cNvCxnSpPr>
+          <p:nvPr/>
+        </p:nvCxnSpPr>
+        <p:spPr>
+          <a:xfrm flipV="1">
+            <a:off x="2303585" y="2628329"/>
+            <a:ext cx="1204855" cy="2137472"/>
+          </a:xfrm>
+          <a:prstGeom prst="line">
+            <a:avLst/>
+          </a:prstGeom>
+          <a:ln>
+            <a:solidFill>
+              <a:schemeClr val="tx1"/>
+            </a:solidFill>
+            <a:prstDash val="dash"/>
+          </a:ln>
+        </p:spPr>
+        <p:style>
+          <a:lnRef idx="1">
+            <a:schemeClr val="accent1"/>
+          </a:lnRef>
+          <a:fillRef idx="0">
+            <a:schemeClr val="accent1"/>
+          </a:fillRef>
+          <a:effectRef idx="0">
+            <a:schemeClr val="accent1"/>
+          </a:effectRef>
+          <a:fontRef idx="minor">
+            <a:schemeClr val="tx1"/>
+          </a:fontRef>
+        </p:style>
+      </p:cxnSp>
+      <p:cxnSp>
+        <p:nvCxnSpPr>
+          <p:cNvPr id="91" name="Straight Connector 90">
+            <a:extLst>
+              <a:ext uri="{FF2B5EF4-FFF2-40B4-BE49-F238E27FC236}">
+                <a16:creationId xmlns:a16="http://schemas.microsoft.com/office/drawing/2014/main" id="{89A779AB-6C36-40E0-BCD5-8CA1F81B9738}"/>
+              </a:ext>
+            </a:extLst>
+          </p:cNvPr>
+          <p:cNvCxnSpPr>
+            <a:cxnSpLocks/>
+            <a:stCxn id="6" idx="6"/>
+            <a:endCxn id="25" idx="2"/>
+          </p:cNvCxnSpPr>
+          <p:nvPr/>
+        </p:nvCxnSpPr>
+        <p:spPr>
+          <a:xfrm flipV="1">
+            <a:off x="2303585" y="3678725"/>
+            <a:ext cx="1226313" cy="1087076"/>
+          </a:xfrm>
+          <a:prstGeom prst="line">
+            <a:avLst/>
+          </a:prstGeom>
+          <a:ln>
+            <a:solidFill>
+              <a:schemeClr val="tx1"/>
+            </a:solidFill>
+            <a:prstDash val="dash"/>
+          </a:ln>
+        </p:spPr>
+        <p:style>
+          <a:lnRef idx="1">
+            <a:schemeClr val="accent1"/>
+          </a:lnRef>
+          <a:fillRef idx="0">
+            <a:schemeClr val="accent1"/>
+          </a:fillRef>
+          <a:effectRef idx="0">
+            <a:schemeClr val="accent1"/>
+          </a:effectRef>
+          <a:fontRef idx="minor">
+            <a:schemeClr val="tx1"/>
+          </a:fontRef>
+        </p:style>
+      </p:cxnSp>
+      <p:cxnSp>
+        <p:nvCxnSpPr>
+          <p:cNvPr id="102" name="Straight Connector 101">
+            <a:extLst>
+              <a:ext uri="{FF2B5EF4-FFF2-40B4-BE49-F238E27FC236}">
+                <a16:creationId xmlns:a16="http://schemas.microsoft.com/office/drawing/2014/main" id="{D19DF20C-7A2C-483A-B4C0-3912628B376A}"/>
+              </a:ext>
+            </a:extLst>
+          </p:cNvPr>
+          <p:cNvCxnSpPr>
+            <a:cxnSpLocks/>
+            <a:stCxn id="6" idx="6"/>
+            <a:endCxn id="30" idx="2"/>
+          </p:cNvCxnSpPr>
+          <p:nvPr/>
+        </p:nvCxnSpPr>
+        <p:spPr>
+          <a:xfrm>
+            <a:off x="2303585" y="4765801"/>
+            <a:ext cx="1226313" cy="0"/>
+          </a:xfrm>
+          <a:prstGeom prst="line">
+            <a:avLst/>
+          </a:prstGeom>
+          <a:ln>
+            <a:solidFill>
+              <a:schemeClr val="tx1"/>
+            </a:solidFill>
+            <a:prstDash val="dash"/>
+          </a:ln>
+        </p:spPr>
+        <p:style>
+          <a:lnRef idx="1">
+            <a:schemeClr val="accent1"/>
+          </a:lnRef>
+          <a:fillRef idx="0">
+            <a:schemeClr val="accent1"/>
+          </a:fillRef>
+          <a:effectRef idx="0">
+            <a:schemeClr val="accent1"/>
+          </a:effectRef>
+          <a:fontRef idx="minor">
+            <a:schemeClr val="tx1"/>
+          </a:fontRef>
+        </p:style>
+      </p:cxnSp>
+      <p:cxnSp>
+        <p:nvCxnSpPr>
+          <p:cNvPr id="104" name="Straight Arrow Connector 103">
+            <a:extLst>
+              <a:ext uri="{FF2B5EF4-FFF2-40B4-BE49-F238E27FC236}">
+                <a16:creationId xmlns:a16="http://schemas.microsoft.com/office/drawing/2014/main" id="{3A8C4EFC-7D79-4D22-8F2C-CA18A9ECF7A9}"/>
+              </a:ext>
+            </a:extLst>
+          </p:cNvPr>
+          <p:cNvCxnSpPr>
+            <a:stCxn id="7" idx="6"/>
+            <a:endCxn id="58" idx="1"/>
+          </p:cNvCxnSpPr>
+          <p:nvPr/>
+        </p:nvCxnSpPr>
+        <p:spPr>
+          <a:xfrm>
+            <a:off x="4215698" y="1504571"/>
+            <a:ext cx="970195" cy="1722479"/>
+          </a:xfrm>
+          <a:prstGeom prst="straightConnector1">
+            <a:avLst/>
+          </a:prstGeom>
+          <a:ln>
+            <a:tailEnd type="triangle"/>
+          </a:ln>
+        </p:spPr>
+        <p:style>
+          <a:lnRef idx="1">
+            <a:schemeClr val="accent1"/>
+          </a:lnRef>
+          <a:fillRef idx="0">
+            <a:schemeClr val="accent1"/>
+          </a:fillRef>
+          <a:effectRef idx="0">
+            <a:schemeClr val="accent1"/>
+          </a:effectRef>
+          <a:fontRef idx="minor">
+            <a:schemeClr val="tx1"/>
+          </a:fontRef>
+        </p:style>
+      </p:cxnSp>
+      <p:cxnSp>
+        <p:nvCxnSpPr>
+          <p:cNvPr id="108" name="Straight Arrow Connector 107">
+            <a:extLst>
+              <a:ext uri="{FF2B5EF4-FFF2-40B4-BE49-F238E27FC236}">
+                <a16:creationId xmlns:a16="http://schemas.microsoft.com/office/drawing/2014/main" id="{6E1D3A54-5C48-4B69-8FDC-6419095C31DF}"/>
+              </a:ext>
+            </a:extLst>
+          </p:cNvPr>
+          <p:cNvCxnSpPr>
+            <a:stCxn id="15" idx="6"/>
+            <a:endCxn id="56" idx="2"/>
+          </p:cNvCxnSpPr>
+          <p:nvPr/>
+        </p:nvCxnSpPr>
+        <p:spPr>
+          <a:xfrm>
+            <a:off x="4215698" y="2591648"/>
+            <a:ext cx="970195" cy="635402"/>
+          </a:xfrm>
+          <a:prstGeom prst="straightConnector1">
+            <a:avLst/>
+          </a:prstGeom>
+          <a:ln>
+            <a:tailEnd type="triangle"/>
+          </a:ln>
+        </p:spPr>
+        <p:style>
+          <a:lnRef idx="1">
+            <a:schemeClr val="accent1"/>
+          </a:lnRef>
+          <a:fillRef idx="0">
+            <a:schemeClr val="accent1"/>
+          </a:fillRef>
+          <a:effectRef idx="0">
+            <a:schemeClr val="accent1"/>
+          </a:effectRef>
+          <a:fontRef idx="minor">
+            <a:schemeClr val="tx1"/>
+          </a:fontRef>
+        </p:style>
+      </p:cxnSp>
+      <p:cxnSp>
+        <p:nvCxnSpPr>
+          <p:cNvPr id="112" name="Straight Arrow Connector 111">
+            <a:extLst>
+              <a:ext uri="{FF2B5EF4-FFF2-40B4-BE49-F238E27FC236}">
+                <a16:creationId xmlns:a16="http://schemas.microsoft.com/office/drawing/2014/main" id="{C1C8CDCC-CCBA-4330-8882-E0E73A2A7375}"/>
+              </a:ext>
+            </a:extLst>
+          </p:cNvPr>
+          <p:cNvCxnSpPr>
+            <a:stCxn id="25" idx="6"/>
+            <a:endCxn id="56" idx="2"/>
+          </p:cNvCxnSpPr>
+          <p:nvPr/>
+        </p:nvCxnSpPr>
+        <p:spPr>
+          <a:xfrm flipV="1">
+            <a:off x="4215698" y="3227050"/>
+            <a:ext cx="970195" cy="451675"/>
+          </a:xfrm>
+          <a:prstGeom prst="straightConnector1">
+            <a:avLst/>
+          </a:prstGeom>
+          <a:ln>
+            <a:tailEnd type="triangle"/>
+          </a:ln>
+        </p:spPr>
+        <p:style>
+          <a:lnRef idx="1">
+            <a:schemeClr val="accent1"/>
+          </a:lnRef>
+          <a:fillRef idx="0">
+            <a:schemeClr val="accent1"/>
+          </a:fillRef>
+          <a:effectRef idx="0">
+            <a:schemeClr val="accent1"/>
+          </a:effectRef>
+          <a:fontRef idx="minor">
+            <a:schemeClr val="tx1"/>
+          </a:fontRef>
+        </p:style>
+      </p:cxnSp>
+      <p:cxnSp>
+        <p:nvCxnSpPr>
+          <p:cNvPr id="114" name="Straight Arrow Connector 113">
+            <a:extLst>
+              <a:ext uri="{FF2B5EF4-FFF2-40B4-BE49-F238E27FC236}">
+                <a16:creationId xmlns:a16="http://schemas.microsoft.com/office/drawing/2014/main" id="{5A8C670A-35FC-4529-BBF5-91D498BA9BFB}"/>
+              </a:ext>
+            </a:extLst>
+          </p:cNvPr>
+          <p:cNvCxnSpPr>
+            <a:stCxn id="30" idx="6"/>
+            <a:endCxn id="56" idx="2"/>
+          </p:cNvCxnSpPr>
+          <p:nvPr/>
+        </p:nvCxnSpPr>
+        <p:spPr>
+          <a:xfrm flipV="1">
+            <a:off x="4215698" y="3227050"/>
+            <a:ext cx="970195" cy="1538751"/>
+          </a:xfrm>
+          <a:prstGeom prst="straightConnector1">
+            <a:avLst/>
+          </a:prstGeom>
+          <a:ln>
+            <a:tailEnd type="triangle"/>
+          </a:ln>
+        </p:spPr>
+        <p:style>
+          <a:lnRef idx="1">
+            <a:schemeClr val="accent1"/>
+          </a:lnRef>
+          <a:fillRef idx="0">
+            <a:schemeClr val="accent1"/>
+          </a:fillRef>
+          <a:effectRef idx="0">
+            <a:schemeClr val="accent1"/>
+          </a:effectRef>
+          <a:fontRef idx="minor">
+            <a:schemeClr val="tx1"/>
+          </a:fontRef>
+        </p:style>
+      </p:cxnSp>
+      <p:cxnSp>
+        <p:nvCxnSpPr>
+          <p:cNvPr id="117" name="Straight Connector 116">
+            <a:extLst>
+              <a:ext uri="{FF2B5EF4-FFF2-40B4-BE49-F238E27FC236}">
+                <a16:creationId xmlns:a16="http://schemas.microsoft.com/office/drawing/2014/main" id="{B9CA5240-DCE5-4966-A02A-4B5F377CC133}"/>
+              </a:ext>
+            </a:extLst>
+          </p:cNvPr>
+          <p:cNvCxnSpPr>
+            <a:stCxn id="36" idx="6"/>
+          </p:cNvCxnSpPr>
+          <p:nvPr/>
+        </p:nvCxnSpPr>
+        <p:spPr>
+          <a:xfrm flipV="1">
+            <a:off x="4084368" y="3246281"/>
+            <a:ext cx="1101525" cy="2508104"/>
+          </a:xfrm>
+          <a:prstGeom prst="line">
+            <a:avLst/>
+          </a:prstGeom>
+          <a:ln>
+            <a:solidFill>
+              <a:schemeClr val="tx1"/>
+            </a:solidFill>
+            <a:prstDash val="dash"/>
+          </a:ln>
+        </p:spPr>
+        <p:style>
+          <a:lnRef idx="1">
+            <a:schemeClr val="accent1"/>
+          </a:lnRef>
+          <a:fillRef idx="0">
+            <a:schemeClr val="accent1"/>
+          </a:fillRef>
+          <a:effectRef idx="0">
+            <a:schemeClr val="accent1"/>
+          </a:effectRef>
+          <a:fontRef idx="minor">
+            <a:schemeClr val="tx1"/>
+          </a:fontRef>
+        </p:style>
+      </p:cxnSp>
+      <p:sp>
+        <p:nvSpPr>
+          <p:cNvPr id="127" name="Arc 126">
+            <a:extLst>
+              <a:ext uri="{FF2B5EF4-FFF2-40B4-BE49-F238E27FC236}">
+                <a16:creationId xmlns:a16="http://schemas.microsoft.com/office/drawing/2014/main" id="{D1A4A02D-7ACB-4DAB-B97C-CC34DA8D4728}"/>
+              </a:ext>
+            </a:extLst>
+          </p:cNvPr>
+          <p:cNvSpPr/>
+          <p:nvPr/>
+        </p:nvSpPr>
+        <p:spPr>
+          <a:xfrm>
+            <a:off x="2031570" y="4031906"/>
+            <a:ext cx="614914" cy="1951074"/>
+          </a:xfrm>
+          <a:prstGeom prst="arc">
+            <a:avLst/>
+          </a:prstGeom>
+          <a:ln>
+            <a:solidFill>
+              <a:schemeClr val="tx1"/>
+            </a:solidFill>
+          </a:ln>
+        </p:spPr>
+        <p:style>
+          <a:lnRef idx="1">
+            <a:schemeClr val="accent1"/>
+          </a:lnRef>
+          <a:fillRef idx="0">
+            <a:schemeClr val="accent1"/>
+          </a:fillRef>
+          <a:effectRef idx="0">
+            <a:schemeClr val="accent1"/>
+          </a:effectRef>
+          <a:fontRef idx="minor">
+            <a:schemeClr val="tx1"/>
+          </a:fontRef>
+        </p:style>
+        <p:txBody>
+          <a:bodyPr rtlCol="0" anchor="ctr"/>
+          <a:lstStyle/>
+          <a:p>
+            <a:pPr algn="ctr"/>
+            <a:endParaRPr lang="en-US"/>
+          </a:p>
+        </p:txBody>
+      </p:sp>
+      <p:sp>
+        <p:nvSpPr>
+          <p:cNvPr id="129" name="TextBox 128">
+            <a:extLst>
+              <a:ext uri="{FF2B5EF4-FFF2-40B4-BE49-F238E27FC236}">
+                <a16:creationId xmlns:a16="http://schemas.microsoft.com/office/drawing/2014/main" id="{122DC956-BF21-4AA5-AFD1-926B0FB6074B}"/>
+              </a:ext>
+            </a:extLst>
+          </p:cNvPr>
+          <p:cNvSpPr txBox="1"/>
+          <p:nvPr/>
+        </p:nvSpPr>
+        <p:spPr>
+          <a:xfrm>
+            <a:off x="2092016" y="4996810"/>
+            <a:ext cx="1226313" cy="276999"/>
+          </a:xfrm>
+          <a:prstGeom prst="rect">
+            <a:avLst/>
+          </a:prstGeom>
+          <a:noFill/>
+        </p:spPr>
+        <p:txBody>
+          <a:bodyPr wrap="square" rtlCol="0">
+            <a:spAutoFit/>
+          </a:bodyPr>
+          <a:lstStyle/>
+          <a:p>
+            <a:r>
+              <a:rPr lang="en-US" sz="1200" b="1" dirty="0"/>
+              <a:t>b</a:t>
+            </a:r>
+            <a:r>
+              <a:rPr lang="en-US" sz="1200" b="1" baseline="-25000" dirty="0"/>
+              <a:t>11</a:t>
+            </a:r>
+            <a:r>
+              <a:rPr lang="en-US" sz="1200" b="1" dirty="0"/>
+              <a:t>, b</a:t>
+            </a:r>
+            <a:r>
+              <a:rPr lang="en-US" sz="1200" b="1" baseline="-25000" dirty="0"/>
+              <a:t>12</a:t>
+            </a:r>
+            <a:r>
+              <a:rPr lang="en-US" sz="1200" b="1" dirty="0"/>
+              <a:t>, b</a:t>
+            </a:r>
+            <a:r>
+              <a:rPr lang="en-US" sz="1200" b="1" baseline="-25000" dirty="0"/>
+              <a:t>13</a:t>
+            </a:r>
+            <a:r>
+              <a:rPr lang="en-US" sz="1200" b="1" dirty="0"/>
+              <a:t>, b</a:t>
+            </a:r>
+            <a:r>
+              <a:rPr lang="en-US" sz="1200" b="1" baseline="-25000" dirty="0"/>
+              <a:t>14</a:t>
+            </a:r>
+          </a:p>
+        </p:txBody>
+      </p:sp>
+      <p:sp>
+        <p:nvSpPr>
+          <p:cNvPr id="130" name="TextBox 129">
+            <a:extLst>
+              <a:ext uri="{FF2B5EF4-FFF2-40B4-BE49-F238E27FC236}">
+                <a16:creationId xmlns:a16="http://schemas.microsoft.com/office/drawing/2014/main" id="{23FF08E4-FB88-45BD-96FD-E74CEF3FD6B0}"/>
+              </a:ext>
+            </a:extLst>
+          </p:cNvPr>
+          <p:cNvSpPr txBox="1"/>
+          <p:nvPr/>
+        </p:nvSpPr>
+        <p:spPr>
+          <a:xfrm>
+            <a:off x="4381792" y="1715612"/>
+            <a:ext cx="506675" cy="276999"/>
+          </a:xfrm>
+          <a:prstGeom prst="rect">
+            <a:avLst/>
+          </a:prstGeom>
+          <a:noFill/>
+        </p:spPr>
+        <p:txBody>
+          <a:bodyPr wrap="square" rtlCol="0">
+            <a:spAutoFit/>
+          </a:bodyPr>
+          <a:lstStyle/>
+          <a:p>
+            <a:r>
+              <a:rPr lang="en-US" sz="1200" b="1" dirty="0"/>
+              <a:t>w</a:t>
+            </a:r>
+            <a:r>
+              <a:rPr lang="en-US" sz="1200" b="1" baseline="-25000" dirty="0"/>
+              <a:t>9</a:t>
+            </a:r>
+          </a:p>
+        </p:txBody>
+      </p:sp>
+      <p:sp>
+        <p:nvSpPr>
+          <p:cNvPr id="131" name="TextBox 130">
+            <a:extLst>
+              <a:ext uri="{FF2B5EF4-FFF2-40B4-BE49-F238E27FC236}">
+                <a16:creationId xmlns:a16="http://schemas.microsoft.com/office/drawing/2014/main" id="{990CB4BB-D81D-44B9-9EC4-6BB32CD48549}"/>
+              </a:ext>
+            </a:extLst>
+          </p:cNvPr>
+          <p:cNvSpPr txBox="1"/>
+          <p:nvPr/>
+        </p:nvSpPr>
+        <p:spPr>
+          <a:xfrm>
+            <a:off x="4406490" y="2564278"/>
+            <a:ext cx="506675" cy="276999"/>
+          </a:xfrm>
+          <a:prstGeom prst="rect">
+            <a:avLst/>
+          </a:prstGeom>
+          <a:noFill/>
+        </p:spPr>
+        <p:txBody>
+          <a:bodyPr wrap="square" rtlCol="0">
+            <a:spAutoFit/>
+          </a:bodyPr>
+          <a:lstStyle/>
+          <a:p>
+            <a:r>
+              <a:rPr lang="en-US" sz="1200" b="1" dirty="0"/>
+              <a:t>w</a:t>
+            </a:r>
+            <a:r>
+              <a:rPr lang="en-US" sz="1200" b="1" baseline="-25000" dirty="0"/>
+              <a:t>10</a:t>
+            </a:r>
+          </a:p>
+        </p:txBody>
+      </p:sp>
+      <p:sp>
+        <p:nvSpPr>
+          <p:cNvPr id="132" name="TextBox 131">
+            <a:extLst>
+              <a:ext uri="{FF2B5EF4-FFF2-40B4-BE49-F238E27FC236}">
+                <a16:creationId xmlns:a16="http://schemas.microsoft.com/office/drawing/2014/main" id="{2EE47987-5B16-41FF-8F5A-BB3F184EA077}"/>
+              </a:ext>
+            </a:extLst>
+          </p:cNvPr>
+          <p:cNvSpPr txBox="1"/>
+          <p:nvPr/>
+        </p:nvSpPr>
+        <p:spPr>
+          <a:xfrm>
+            <a:off x="4427267" y="3171965"/>
+            <a:ext cx="506675" cy="276999"/>
+          </a:xfrm>
+          <a:prstGeom prst="rect">
+            <a:avLst/>
+          </a:prstGeom>
+          <a:noFill/>
+        </p:spPr>
+        <p:txBody>
+          <a:bodyPr wrap="square" rtlCol="0">
+            <a:spAutoFit/>
+          </a:bodyPr>
+          <a:lstStyle/>
+          <a:p>
+            <a:r>
+              <a:rPr lang="en-US" sz="1200" b="1" dirty="0"/>
+              <a:t>w</a:t>
+            </a:r>
+            <a:r>
+              <a:rPr lang="en-US" sz="1200" b="1" baseline="-25000" dirty="0"/>
+              <a:t>11</a:t>
+            </a:r>
+          </a:p>
+        </p:txBody>
+      </p:sp>
+      <p:sp>
+        <p:nvSpPr>
+          <p:cNvPr id="133" name="TextBox 132">
+            <a:extLst>
+              <a:ext uri="{FF2B5EF4-FFF2-40B4-BE49-F238E27FC236}">
+                <a16:creationId xmlns:a16="http://schemas.microsoft.com/office/drawing/2014/main" id="{D919F475-A87D-4359-94F6-AEB53E868DD0}"/>
+              </a:ext>
+            </a:extLst>
+          </p:cNvPr>
+          <p:cNvSpPr txBox="1"/>
+          <p:nvPr/>
+        </p:nvSpPr>
+        <p:spPr>
+          <a:xfrm>
+            <a:off x="4361887" y="3755980"/>
+            <a:ext cx="506675" cy="276999"/>
+          </a:xfrm>
+          <a:prstGeom prst="rect">
+            <a:avLst/>
+          </a:prstGeom>
+          <a:noFill/>
+        </p:spPr>
+        <p:txBody>
+          <a:bodyPr wrap="square" rtlCol="0">
+            <a:spAutoFit/>
+          </a:bodyPr>
+          <a:lstStyle/>
+          <a:p>
+            <a:r>
+              <a:rPr lang="en-US" sz="1200" b="1" dirty="0"/>
+              <a:t>w</a:t>
+            </a:r>
+            <a:r>
+              <a:rPr lang="en-US" sz="1200" b="1" baseline="-25000" dirty="0"/>
+              <a:t>12</a:t>
+            </a:r>
+          </a:p>
+        </p:txBody>
+      </p:sp>
+      <p:sp>
+        <p:nvSpPr>
+          <p:cNvPr id="134" name="TextBox 133">
+            <a:extLst>
+              <a:ext uri="{FF2B5EF4-FFF2-40B4-BE49-F238E27FC236}">
+                <a16:creationId xmlns:a16="http://schemas.microsoft.com/office/drawing/2014/main" id="{5127D34E-0C65-46F2-8887-A27A74C2A0CE}"/>
+              </a:ext>
+            </a:extLst>
+          </p:cNvPr>
+          <p:cNvSpPr txBox="1"/>
+          <p:nvPr/>
+        </p:nvSpPr>
+        <p:spPr>
+          <a:xfrm>
+            <a:off x="1016188" y="2034017"/>
+            <a:ext cx="1679224" cy="338554"/>
+          </a:xfrm>
+          <a:prstGeom prst="rect">
+            <a:avLst/>
+          </a:prstGeom>
+          <a:noFill/>
+        </p:spPr>
+        <p:txBody>
+          <a:bodyPr wrap="square" rtlCol="0">
+            <a:spAutoFit/>
+          </a:bodyPr>
+          <a:lstStyle/>
+          <a:p>
+            <a:r>
+              <a:rPr lang="en-US" sz="1600" b="1" dirty="0"/>
+              <a:t>Layer 0</a:t>
+            </a:r>
+            <a:r>
+              <a:rPr lang="en-US" sz="1600" dirty="0"/>
+              <a:t>:  Input (X)</a:t>
+            </a:r>
+          </a:p>
+        </p:txBody>
+      </p:sp>
+      <p:sp>
+        <p:nvSpPr>
+          <p:cNvPr id="135" name="TextBox 134">
+            <a:extLst>
+              <a:ext uri="{FF2B5EF4-FFF2-40B4-BE49-F238E27FC236}">
+                <a16:creationId xmlns:a16="http://schemas.microsoft.com/office/drawing/2014/main" id="{1FABE711-7B4D-4612-B3EE-E39E973F8B12}"/>
+              </a:ext>
+            </a:extLst>
+          </p:cNvPr>
+          <p:cNvSpPr txBox="1"/>
+          <p:nvPr/>
+        </p:nvSpPr>
+        <p:spPr>
+          <a:xfrm>
+            <a:off x="2947634" y="583687"/>
+            <a:ext cx="2273467" cy="584775"/>
+          </a:xfrm>
+          <a:prstGeom prst="rect">
+            <a:avLst/>
+          </a:prstGeom>
+          <a:noFill/>
+        </p:spPr>
+        <p:txBody>
+          <a:bodyPr wrap="square" rtlCol="0">
+            <a:spAutoFit/>
+          </a:bodyPr>
+          <a:lstStyle/>
+          <a:p>
+            <a:r>
+              <a:rPr lang="en-US" sz="1600" b="1" dirty="0"/>
+              <a:t>Layer 1</a:t>
+            </a:r>
+            <a:r>
+              <a:rPr lang="en-US" sz="1600" dirty="0"/>
+              <a:t>:  Hidden (Z1|A1)</a:t>
+            </a:r>
+          </a:p>
+          <a:p>
+            <a:r>
+              <a:rPr lang="en-US" sz="1600" dirty="0"/>
+              <a:t>Activation:  tanh</a:t>
+            </a:r>
+          </a:p>
+        </p:txBody>
+      </p:sp>
+      <p:sp>
+        <p:nvSpPr>
+          <p:cNvPr id="137" name="TextBox 136">
+            <a:extLst>
+              <a:ext uri="{FF2B5EF4-FFF2-40B4-BE49-F238E27FC236}">
+                <a16:creationId xmlns:a16="http://schemas.microsoft.com/office/drawing/2014/main" id="{435F5440-993D-41CD-BDE5-E7DB78160E22}"/>
+              </a:ext>
+            </a:extLst>
+          </p:cNvPr>
+          <p:cNvSpPr txBox="1"/>
+          <p:nvPr/>
+        </p:nvSpPr>
+        <p:spPr>
+          <a:xfrm>
+            <a:off x="5078187" y="2304224"/>
+            <a:ext cx="2414789" cy="584775"/>
+          </a:xfrm>
+          <a:prstGeom prst="rect">
+            <a:avLst/>
+          </a:prstGeom>
+          <a:noFill/>
+        </p:spPr>
+        <p:txBody>
+          <a:bodyPr wrap="square" rtlCol="0">
+            <a:spAutoFit/>
+          </a:bodyPr>
+          <a:lstStyle/>
+          <a:p>
+            <a:r>
+              <a:rPr lang="en-US" sz="1600" b="1" dirty="0"/>
+              <a:t>Layer 2</a:t>
+            </a:r>
+            <a:r>
+              <a:rPr lang="en-US" sz="1600" dirty="0"/>
+              <a:t>:  Output (Z2|A2)</a:t>
+            </a:r>
+          </a:p>
+          <a:p>
+            <a:r>
+              <a:rPr lang="en-US" sz="1600" dirty="0"/>
+              <a:t>Activation:  sigmoid</a:t>
+            </a:r>
+          </a:p>
+        </p:txBody>
+      </p:sp>
+      <p:cxnSp>
+        <p:nvCxnSpPr>
+          <p:cNvPr id="139" name="Straight Arrow Connector 138">
+            <a:extLst>
+              <a:ext uri="{FF2B5EF4-FFF2-40B4-BE49-F238E27FC236}">
+                <a16:creationId xmlns:a16="http://schemas.microsoft.com/office/drawing/2014/main" id="{D199B466-F8B2-4952-8D11-504D34BF8B0A}"/>
+              </a:ext>
+            </a:extLst>
+          </p:cNvPr>
+          <p:cNvCxnSpPr>
+            <a:cxnSpLocks/>
+          </p:cNvCxnSpPr>
+          <p:nvPr/>
+        </p:nvCxnSpPr>
+        <p:spPr>
+          <a:xfrm flipV="1">
+            <a:off x="6066423" y="3233564"/>
+            <a:ext cx="1031063" cy="12717"/>
+          </a:xfrm>
+          <a:prstGeom prst="straightConnector1">
+            <a:avLst/>
+          </a:prstGeom>
+          <a:ln>
+            <a:tailEnd type="triangle"/>
+          </a:ln>
+        </p:spPr>
+        <p:style>
+          <a:lnRef idx="1">
+            <a:schemeClr val="accent1"/>
+          </a:lnRef>
+          <a:fillRef idx="0">
+            <a:schemeClr val="accent1"/>
+          </a:fillRef>
+          <a:effectRef idx="0">
+            <a:schemeClr val="accent1"/>
+          </a:effectRef>
+          <a:fontRef idx="minor">
+            <a:schemeClr val="tx1"/>
+          </a:fontRef>
+        </p:style>
+      </p:cxnSp>
+      <p:sp>
+        <p:nvSpPr>
+          <p:cNvPr id="140" name="TextBox 139">
+            <a:extLst>
+              <a:ext uri="{FF2B5EF4-FFF2-40B4-BE49-F238E27FC236}">
+                <a16:creationId xmlns:a16="http://schemas.microsoft.com/office/drawing/2014/main" id="{3C8BDB19-49EE-4453-B52B-5809630F52F6}"/>
+              </a:ext>
+            </a:extLst>
+          </p:cNvPr>
+          <p:cNvSpPr txBox="1"/>
+          <p:nvPr/>
+        </p:nvSpPr>
+        <p:spPr>
+          <a:xfrm>
+            <a:off x="7289801" y="3042384"/>
+            <a:ext cx="798284" cy="369332"/>
+          </a:xfrm>
+          <a:prstGeom prst="rect">
+            <a:avLst/>
+          </a:prstGeom>
+          <a:noFill/>
+        </p:spPr>
+        <p:txBody>
+          <a:bodyPr wrap="square" rtlCol="0">
+            <a:spAutoFit/>
+          </a:bodyPr>
+          <a:lstStyle/>
+          <a:p>
+            <a:r>
+              <a:rPr lang="en-US" dirty="0"/>
+              <a:t>0.32</a:t>
+            </a:r>
+          </a:p>
+        </p:txBody>
+      </p:sp>
+      <p:sp>
+        <p:nvSpPr>
+          <p:cNvPr id="142" name="TextBox 141">
+            <a:extLst>
+              <a:ext uri="{FF2B5EF4-FFF2-40B4-BE49-F238E27FC236}">
+                <a16:creationId xmlns:a16="http://schemas.microsoft.com/office/drawing/2014/main" id="{304ABFF4-5AD2-4911-987F-CEEF0AAF61EC}"/>
+              </a:ext>
+            </a:extLst>
+          </p:cNvPr>
+          <p:cNvSpPr txBox="1"/>
+          <p:nvPr/>
+        </p:nvSpPr>
+        <p:spPr>
+          <a:xfrm>
+            <a:off x="9240411" y="3009080"/>
+            <a:ext cx="399142" cy="369332"/>
+          </a:xfrm>
+          <a:prstGeom prst="rect">
+            <a:avLst/>
+          </a:prstGeom>
+          <a:noFill/>
+        </p:spPr>
+        <p:txBody>
+          <a:bodyPr wrap="square" rtlCol="0">
+            <a:spAutoFit/>
+          </a:bodyPr>
+          <a:lstStyle/>
+          <a:p>
+            <a:r>
+              <a:rPr lang="en-US" dirty="0"/>
+              <a:t>0</a:t>
+            </a:r>
+          </a:p>
+        </p:txBody>
+      </p:sp>
+      <p:cxnSp>
+        <p:nvCxnSpPr>
+          <p:cNvPr id="145" name="Straight Arrow Connector 144">
+            <a:extLst>
+              <a:ext uri="{FF2B5EF4-FFF2-40B4-BE49-F238E27FC236}">
+                <a16:creationId xmlns:a16="http://schemas.microsoft.com/office/drawing/2014/main" id="{6667E64B-55EB-40B4-B19D-33D142F36E7E}"/>
+              </a:ext>
+            </a:extLst>
+          </p:cNvPr>
+          <p:cNvCxnSpPr>
+            <a:cxnSpLocks/>
+          </p:cNvCxnSpPr>
+          <p:nvPr/>
+        </p:nvCxnSpPr>
+        <p:spPr>
+          <a:xfrm flipV="1">
+            <a:off x="8088085" y="3214333"/>
+            <a:ext cx="1031063" cy="12717"/>
+          </a:xfrm>
+          <a:prstGeom prst="straightConnector1">
+            <a:avLst/>
+          </a:prstGeom>
+          <a:ln>
+            <a:tailEnd type="triangle"/>
+          </a:ln>
+        </p:spPr>
+        <p:style>
+          <a:lnRef idx="1">
+            <a:schemeClr val="accent1"/>
+          </a:lnRef>
+          <a:fillRef idx="0">
+            <a:schemeClr val="accent1"/>
+          </a:fillRef>
+          <a:effectRef idx="0">
+            <a:schemeClr val="accent1"/>
+          </a:effectRef>
+          <a:fontRef idx="minor">
+            <a:schemeClr val="tx1"/>
+          </a:fontRef>
+        </p:style>
+      </p:cxnSp>
+      <p:sp>
+        <p:nvSpPr>
+          <p:cNvPr id="146" name="TextBox 145">
+            <a:extLst>
+              <a:ext uri="{FF2B5EF4-FFF2-40B4-BE49-F238E27FC236}">
+                <a16:creationId xmlns:a16="http://schemas.microsoft.com/office/drawing/2014/main" id="{3306B3BE-AF26-4359-A80D-5B286F55CAB4}"/>
+              </a:ext>
+            </a:extLst>
+          </p:cNvPr>
+          <p:cNvSpPr txBox="1"/>
+          <p:nvPr/>
+        </p:nvSpPr>
+        <p:spPr>
+          <a:xfrm>
+            <a:off x="8890255" y="2753619"/>
+            <a:ext cx="1231875" cy="338554"/>
+          </a:xfrm>
+          <a:prstGeom prst="rect">
+            <a:avLst/>
+          </a:prstGeom>
+          <a:noFill/>
+        </p:spPr>
+        <p:txBody>
+          <a:bodyPr wrap="square" rtlCol="0">
+            <a:spAutoFit/>
+          </a:bodyPr>
+          <a:lstStyle/>
+          <a:p>
+            <a:r>
+              <a:rPr lang="en-US" sz="1600" dirty="0"/>
+              <a:t>prediction</a:t>
+            </a:r>
+          </a:p>
+        </p:txBody>
+      </p:sp>
+      <p:sp>
+        <p:nvSpPr>
+          <p:cNvPr id="147" name="TextBox 146">
+            <a:extLst>
+              <a:ext uri="{FF2B5EF4-FFF2-40B4-BE49-F238E27FC236}">
+                <a16:creationId xmlns:a16="http://schemas.microsoft.com/office/drawing/2014/main" id="{F9C23FC5-F782-48A5-B756-EB05B7447F83}"/>
+              </a:ext>
+            </a:extLst>
+          </p:cNvPr>
+          <p:cNvSpPr txBox="1"/>
+          <p:nvPr/>
+        </p:nvSpPr>
+        <p:spPr>
+          <a:xfrm>
+            <a:off x="7079176" y="2742862"/>
+            <a:ext cx="1231875" cy="338554"/>
+          </a:xfrm>
+          <a:prstGeom prst="rect">
+            <a:avLst/>
+          </a:prstGeom>
+          <a:noFill/>
+        </p:spPr>
+        <p:txBody>
+          <a:bodyPr wrap="square" rtlCol="0">
+            <a:spAutoFit/>
+          </a:bodyPr>
+          <a:lstStyle/>
+          <a:p>
+            <a:r>
+              <a:rPr lang="en-US" sz="1600" dirty="0"/>
+              <a:t>probability</a:t>
+            </a:r>
+          </a:p>
+        </p:txBody>
+      </p:sp>
+      <p:sp>
+        <p:nvSpPr>
+          <p:cNvPr id="148" name="TextBox 147">
+            <a:extLst>
+              <a:ext uri="{FF2B5EF4-FFF2-40B4-BE49-F238E27FC236}">
+                <a16:creationId xmlns:a16="http://schemas.microsoft.com/office/drawing/2014/main" id="{D1F2DB19-5455-4980-8922-4F96EDA51983}"/>
+              </a:ext>
+            </a:extLst>
+          </p:cNvPr>
+          <p:cNvSpPr txBox="1"/>
+          <p:nvPr/>
+        </p:nvSpPr>
+        <p:spPr>
+          <a:xfrm>
+            <a:off x="3913828" y="5237857"/>
+            <a:ext cx="415724" cy="284903"/>
+          </a:xfrm>
+          <a:prstGeom prst="rect">
+            <a:avLst/>
+          </a:prstGeom>
+          <a:noFill/>
+        </p:spPr>
+        <p:txBody>
+          <a:bodyPr wrap="square" rtlCol="0">
+            <a:spAutoFit/>
+          </a:bodyPr>
+          <a:lstStyle/>
+          <a:p>
+            <a:r>
+              <a:rPr lang="en-US" sz="1200" b="1" dirty="0"/>
+              <a:t>b</a:t>
+            </a:r>
+            <a:r>
+              <a:rPr lang="en-US" sz="1200" b="1" baseline="-25000" dirty="0"/>
+              <a:t>21</a:t>
+            </a:r>
+          </a:p>
+        </p:txBody>
+      </p:sp>
+    </p:spTree>
+    <p:extLst>
+      <p:ext uri="{BB962C8B-B14F-4D97-AF65-F5344CB8AC3E}">
+        <p14:creationId xmlns:p14="http://schemas.microsoft.com/office/powerpoint/2010/main" val="2295598316"/>
+      </p:ext>
+    </p:extLst>
+  </p:cSld>
+  <p:clrMapOvr>
+    <a:masterClrMapping/>
+  </p:clrMapOvr>
+</p:sld>
+</file>
+
+<file path=ppt/slides/slide4.xml><?xml version="1.0" encoding="utf-8"?>
+<p:sld xmlns:a="http://schemas.openxmlformats.org/drawingml/2006/main" xmlns:r="http://schemas.openxmlformats.org/officeDocument/2006/relationships" xmlns:p="http://schemas.openxmlformats.org/presentationml/2006/main">
+  <p:cSld>
+    <p:spTree>
+      <p:nvGrpSpPr>
+        <p:cNvPr id="1" name=""/>
+        <p:cNvGrpSpPr/>
+        <p:nvPr/>
+      </p:nvGrpSpPr>
+      <p:grpSpPr>
+        <a:xfrm>
+          <a:off x="0" y="0"/>
+          <a:ext cx="0" cy="0"/>
+          <a:chOff x="0" y="0"/>
+          <a:chExt cx="0" cy="0"/>
+        </a:xfrm>
+      </p:grpSpPr>
+      <p:sp>
+        <p:nvSpPr>
+          <p:cNvPr id="3" name="Flowchart: Terminator 2">
+            <a:extLst>
+              <a:ext uri="{FF2B5EF4-FFF2-40B4-BE49-F238E27FC236}">
+                <a16:creationId xmlns:a16="http://schemas.microsoft.com/office/drawing/2014/main" id="{DBB40E4D-2F96-44EB-A971-8B429A1C0884}"/>
+              </a:ext>
+            </a:extLst>
+          </p:cNvPr>
+          <p:cNvSpPr/>
+          <p:nvPr/>
+        </p:nvSpPr>
+        <p:spPr>
+          <a:xfrm>
+            <a:off x="1727195" y="337456"/>
+            <a:ext cx="1059543" cy="522515"/>
+          </a:xfrm>
+          <a:prstGeom prst="flowChartTerminator">
+            <a:avLst/>
+          </a:prstGeom>
+          <a:solidFill>
+            <a:schemeClr val="accent6"/>
+          </a:solidFill>
+        </p:spPr>
+        <p:style>
+          <a:lnRef idx="2">
+            <a:schemeClr val="accent1">
+              <a:shade val="50000"/>
+            </a:schemeClr>
+          </a:lnRef>
+          <a:fillRef idx="1">
+            <a:schemeClr val="accent1"/>
+          </a:fillRef>
+          <a:effectRef idx="0">
+            <a:schemeClr val="accent1"/>
+          </a:effectRef>
+          <a:fontRef idx="minor">
+            <a:schemeClr val="lt1"/>
+          </a:fontRef>
+        </p:style>
+        <p:txBody>
+          <a:bodyPr rtlCol="0" anchor="ctr"/>
+          <a:lstStyle/>
+          <a:p>
+            <a:pPr algn="ctr"/>
+            <a:r>
+              <a:rPr lang="en-US" sz="1600" dirty="0"/>
+              <a:t>Start</a:t>
+            </a:r>
+          </a:p>
+        </p:txBody>
+      </p:sp>
+      <p:sp>
+        <p:nvSpPr>
+          <p:cNvPr id="8" name="Flowchart: Predefined Process 7">
+            <a:extLst>
+              <a:ext uri="{FF2B5EF4-FFF2-40B4-BE49-F238E27FC236}">
+                <a16:creationId xmlns:a16="http://schemas.microsoft.com/office/drawing/2014/main" id="{43261C3F-4C00-4ECD-ABE4-CF0407682AB8}"/>
+              </a:ext>
+            </a:extLst>
+          </p:cNvPr>
+          <p:cNvSpPr/>
+          <p:nvPr/>
+        </p:nvSpPr>
+        <p:spPr>
+          <a:xfrm>
+            <a:off x="1320795" y="1288143"/>
+            <a:ext cx="1872343" cy="762000"/>
+          </a:xfrm>
+          <a:prstGeom prst="flowChartPredefinedProcess">
+            <a:avLst/>
+          </a:prstGeom>
+        </p:spPr>
+        <p:style>
+          <a:lnRef idx="2">
+            <a:schemeClr val="accent1">
+              <a:shade val="50000"/>
+            </a:schemeClr>
+          </a:lnRef>
+          <a:fillRef idx="1">
+            <a:schemeClr val="accent1"/>
+          </a:fillRef>
+          <a:effectRef idx="0">
+            <a:schemeClr val="accent1"/>
+          </a:effectRef>
+          <a:fontRef idx="minor">
+            <a:schemeClr val="lt1"/>
+          </a:fontRef>
+        </p:style>
+        <p:txBody>
+          <a:bodyPr rtlCol="0" anchor="ctr"/>
+          <a:lstStyle/>
+          <a:p>
+            <a:pPr algn="ctr"/>
+            <a:r>
+              <a:rPr lang="en-US" sz="1600" dirty="0"/>
+              <a:t>Define neural network structure</a:t>
+            </a:r>
+          </a:p>
+        </p:txBody>
+      </p:sp>
+      <p:sp>
+        <p:nvSpPr>
+          <p:cNvPr id="76" name="Flowchart: Predefined Process 75">
+            <a:extLst>
+              <a:ext uri="{FF2B5EF4-FFF2-40B4-BE49-F238E27FC236}">
+                <a16:creationId xmlns:a16="http://schemas.microsoft.com/office/drawing/2014/main" id="{705A19A9-9327-4649-9D9D-3EC1878A6535}"/>
+              </a:ext>
+            </a:extLst>
+          </p:cNvPr>
+          <p:cNvSpPr/>
+          <p:nvPr/>
+        </p:nvSpPr>
+        <p:spPr>
+          <a:xfrm>
+            <a:off x="1320795" y="2398486"/>
+            <a:ext cx="1872343" cy="762000"/>
+          </a:xfrm>
+          <a:prstGeom prst="flowChartPredefinedProcess">
+            <a:avLst/>
+          </a:prstGeom>
+        </p:spPr>
+        <p:style>
+          <a:lnRef idx="2">
+            <a:schemeClr val="accent1">
+              <a:shade val="50000"/>
+            </a:schemeClr>
+          </a:lnRef>
+          <a:fillRef idx="1">
+            <a:schemeClr val="accent1"/>
+          </a:fillRef>
+          <a:effectRef idx="0">
+            <a:schemeClr val="accent1"/>
+          </a:effectRef>
+          <a:fontRef idx="minor">
+            <a:schemeClr val="lt1"/>
+          </a:fontRef>
+        </p:style>
+        <p:txBody>
+          <a:bodyPr rtlCol="0" anchor="ctr"/>
+          <a:lstStyle/>
+          <a:p>
+            <a:pPr algn="ctr"/>
+            <a:r>
+              <a:rPr lang="en-US" sz="1600" dirty="0"/>
+              <a:t>Initialize model parameters</a:t>
+            </a:r>
+          </a:p>
+        </p:txBody>
+      </p:sp>
+      <p:sp>
+        <p:nvSpPr>
+          <p:cNvPr id="77" name="Flowchart: Predefined Process 76">
+            <a:extLst>
+              <a:ext uri="{FF2B5EF4-FFF2-40B4-BE49-F238E27FC236}">
+                <a16:creationId xmlns:a16="http://schemas.microsoft.com/office/drawing/2014/main" id="{2470E763-A252-4B36-A789-1743FA0A3083}"/>
+              </a:ext>
+            </a:extLst>
+          </p:cNvPr>
+          <p:cNvSpPr/>
+          <p:nvPr/>
+        </p:nvSpPr>
+        <p:spPr>
+          <a:xfrm>
+            <a:off x="3802719" y="2398486"/>
+            <a:ext cx="1872343" cy="762000"/>
+          </a:xfrm>
+          <a:prstGeom prst="flowChartPredefinedProcess">
+            <a:avLst/>
+          </a:prstGeom>
+        </p:spPr>
+        <p:style>
+          <a:lnRef idx="2">
+            <a:schemeClr val="accent1">
+              <a:shade val="50000"/>
+            </a:schemeClr>
+          </a:lnRef>
+          <a:fillRef idx="1">
+            <a:schemeClr val="accent1"/>
+          </a:fillRef>
+          <a:effectRef idx="0">
+            <a:schemeClr val="accent1"/>
+          </a:effectRef>
+          <a:fontRef idx="minor">
+            <a:schemeClr val="lt1"/>
+          </a:fontRef>
+        </p:style>
+        <p:txBody>
+          <a:bodyPr rtlCol="0" anchor="ctr"/>
+          <a:lstStyle/>
+          <a:p>
+            <a:pPr algn="ctr"/>
+            <a:r>
+              <a:rPr lang="en-US" sz="1600" dirty="0"/>
+              <a:t>Perform forward propagation</a:t>
+            </a:r>
+          </a:p>
+        </p:txBody>
+      </p:sp>
+      <p:sp>
+        <p:nvSpPr>
+          <p:cNvPr id="78" name="Flowchart: Predefined Process 77">
+            <a:extLst>
+              <a:ext uri="{FF2B5EF4-FFF2-40B4-BE49-F238E27FC236}">
+                <a16:creationId xmlns:a16="http://schemas.microsoft.com/office/drawing/2014/main" id="{C540F864-87EC-49CB-A00E-1D1C3142C7BB}"/>
+              </a:ext>
+            </a:extLst>
+          </p:cNvPr>
+          <p:cNvSpPr/>
+          <p:nvPr/>
+        </p:nvSpPr>
+        <p:spPr>
+          <a:xfrm>
+            <a:off x="6458876" y="2398486"/>
+            <a:ext cx="1872343" cy="762000"/>
+          </a:xfrm>
+          <a:prstGeom prst="flowChartPredefinedProcess">
+            <a:avLst/>
+          </a:prstGeom>
+        </p:spPr>
+        <p:style>
+          <a:lnRef idx="2">
+            <a:schemeClr val="accent1">
+              <a:shade val="50000"/>
+            </a:schemeClr>
+          </a:lnRef>
+          <a:fillRef idx="1">
+            <a:schemeClr val="accent1"/>
+          </a:fillRef>
+          <a:effectRef idx="0">
+            <a:schemeClr val="accent1"/>
+          </a:effectRef>
+          <a:fontRef idx="minor">
+            <a:schemeClr val="lt1"/>
+          </a:fontRef>
+        </p:style>
+        <p:txBody>
+          <a:bodyPr rtlCol="0" anchor="ctr"/>
+          <a:lstStyle/>
+          <a:p>
+            <a:pPr algn="ctr"/>
+            <a:r>
+              <a:rPr lang="en-US" sz="1600" dirty="0"/>
+              <a:t>Compute loss</a:t>
+            </a:r>
+          </a:p>
+        </p:txBody>
+      </p:sp>
+      <p:sp>
+        <p:nvSpPr>
+          <p:cNvPr id="79" name="Flowchart: Predefined Process 78">
+            <a:extLst>
+              <a:ext uri="{FF2B5EF4-FFF2-40B4-BE49-F238E27FC236}">
+                <a16:creationId xmlns:a16="http://schemas.microsoft.com/office/drawing/2014/main" id="{0554D53E-E982-4AC6-8835-F76FBB270B61}"/>
+              </a:ext>
+            </a:extLst>
+          </p:cNvPr>
+          <p:cNvSpPr/>
+          <p:nvPr/>
+        </p:nvSpPr>
+        <p:spPr>
+          <a:xfrm>
+            <a:off x="6458875" y="3439886"/>
+            <a:ext cx="1872343" cy="762000"/>
+          </a:xfrm>
+          <a:prstGeom prst="flowChartPredefinedProcess">
+            <a:avLst/>
+          </a:prstGeom>
+        </p:spPr>
+        <p:style>
+          <a:lnRef idx="2">
+            <a:schemeClr val="accent1">
+              <a:shade val="50000"/>
+            </a:schemeClr>
+          </a:lnRef>
+          <a:fillRef idx="1">
+            <a:schemeClr val="accent1"/>
+          </a:fillRef>
+          <a:effectRef idx="0">
+            <a:schemeClr val="accent1"/>
+          </a:effectRef>
+          <a:fontRef idx="minor">
+            <a:schemeClr val="lt1"/>
+          </a:fontRef>
+        </p:style>
+        <p:txBody>
+          <a:bodyPr rtlCol="0" anchor="ctr"/>
+          <a:lstStyle/>
+          <a:p>
+            <a:pPr algn="ctr"/>
+            <a:r>
+              <a:rPr lang="en-US" sz="1600" dirty="0"/>
+              <a:t>Perform backward propagation</a:t>
+            </a:r>
+          </a:p>
+        </p:txBody>
+      </p:sp>
+      <p:sp>
+        <p:nvSpPr>
+          <p:cNvPr id="80" name="Flowchart: Predefined Process 79">
+            <a:extLst>
+              <a:ext uri="{FF2B5EF4-FFF2-40B4-BE49-F238E27FC236}">
+                <a16:creationId xmlns:a16="http://schemas.microsoft.com/office/drawing/2014/main" id="{7C117160-CE2D-4347-B4FE-249AA9F18CCF}"/>
+              </a:ext>
+            </a:extLst>
+          </p:cNvPr>
+          <p:cNvSpPr/>
+          <p:nvPr/>
+        </p:nvSpPr>
+        <p:spPr>
+          <a:xfrm>
+            <a:off x="6458874" y="4488543"/>
+            <a:ext cx="1872343" cy="762000"/>
+          </a:xfrm>
+          <a:prstGeom prst="flowChartPredefinedProcess">
+            <a:avLst/>
+          </a:prstGeom>
+        </p:spPr>
+        <p:style>
+          <a:lnRef idx="2">
+            <a:schemeClr val="accent1">
+              <a:shade val="50000"/>
+            </a:schemeClr>
+          </a:lnRef>
+          <a:fillRef idx="1">
+            <a:schemeClr val="accent1"/>
+          </a:fillRef>
+          <a:effectRef idx="0">
+            <a:schemeClr val="accent1"/>
+          </a:effectRef>
+          <a:fontRef idx="minor">
+            <a:schemeClr val="lt1"/>
+          </a:fontRef>
+        </p:style>
+        <p:txBody>
+          <a:bodyPr rtlCol="0" anchor="ctr"/>
+          <a:lstStyle/>
+          <a:p>
+            <a:pPr algn="ctr"/>
+            <a:r>
+              <a:rPr lang="en-US" sz="1600" dirty="0"/>
+              <a:t>Update model parameters</a:t>
+            </a:r>
+          </a:p>
+        </p:txBody>
+      </p:sp>
+      <p:sp>
+        <p:nvSpPr>
+          <p:cNvPr id="11" name="Flowchart: Decision 10">
+            <a:extLst>
+              <a:ext uri="{FF2B5EF4-FFF2-40B4-BE49-F238E27FC236}">
+                <a16:creationId xmlns:a16="http://schemas.microsoft.com/office/drawing/2014/main" id="{25D4511D-E89A-4633-8BF6-7F672C809C5A}"/>
+              </a:ext>
+            </a:extLst>
+          </p:cNvPr>
+          <p:cNvSpPr/>
+          <p:nvPr/>
+        </p:nvSpPr>
+        <p:spPr>
+          <a:xfrm>
+            <a:off x="5812977" y="5656943"/>
+            <a:ext cx="3164136" cy="1001484"/>
+          </a:xfrm>
+          <a:prstGeom prst="flowChartDecision">
+            <a:avLst/>
+          </a:prstGeom>
+        </p:spPr>
+        <p:style>
+          <a:lnRef idx="2">
+            <a:schemeClr val="accent1">
+              <a:shade val="50000"/>
+            </a:schemeClr>
+          </a:lnRef>
+          <a:fillRef idx="1">
+            <a:schemeClr val="accent1"/>
+          </a:fillRef>
+          <a:effectRef idx="0">
+            <a:schemeClr val="accent1"/>
+          </a:effectRef>
+          <a:fontRef idx="minor">
+            <a:schemeClr val="lt1"/>
+          </a:fontRef>
+        </p:style>
+        <p:txBody>
+          <a:bodyPr rtlCol="0" anchor="ctr"/>
+          <a:lstStyle/>
+          <a:p>
+            <a:pPr algn="ctr"/>
+            <a:r>
+              <a:rPr lang="en-US" sz="1600" dirty="0"/>
+              <a:t>Has reached stopping criteria?</a:t>
+            </a:r>
+          </a:p>
+        </p:txBody>
+      </p:sp>
+      <p:sp>
+        <p:nvSpPr>
+          <p:cNvPr id="19" name="Flowchart: Connector 18">
+            <a:extLst>
+              <a:ext uri="{FF2B5EF4-FFF2-40B4-BE49-F238E27FC236}">
+                <a16:creationId xmlns:a16="http://schemas.microsoft.com/office/drawing/2014/main" id="{080F4C22-441B-4A57-A286-91E5F7C285D6}"/>
+              </a:ext>
+            </a:extLst>
+          </p:cNvPr>
+          <p:cNvSpPr/>
+          <p:nvPr/>
+        </p:nvSpPr>
+        <p:spPr>
+          <a:xfrm>
+            <a:off x="10051200" y="5776685"/>
+            <a:ext cx="943424" cy="762000"/>
+          </a:xfrm>
+          <a:prstGeom prst="flowChartConnector">
+            <a:avLst/>
+          </a:prstGeom>
+          <a:solidFill>
+            <a:srgbClr val="FF0000"/>
+          </a:solidFill>
+        </p:spPr>
+        <p:style>
+          <a:lnRef idx="2">
+            <a:schemeClr val="accent1">
+              <a:shade val="50000"/>
+            </a:schemeClr>
+          </a:lnRef>
+          <a:fillRef idx="1">
+            <a:schemeClr val="accent1"/>
+          </a:fillRef>
+          <a:effectRef idx="0">
+            <a:schemeClr val="accent1"/>
+          </a:effectRef>
+          <a:fontRef idx="minor">
+            <a:schemeClr val="lt1"/>
+          </a:fontRef>
+        </p:style>
+        <p:txBody>
+          <a:bodyPr rtlCol="0" anchor="ctr"/>
+          <a:lstStyle/>
+          <a:p>
+            <a:pPr algn="ctr"/>
+            <a:r>
+              <a:rPr lang="en-US" dirty="0"/>
+              <a:t>end</a:t>
+            </a:r>
+          </a:p>
+        </p:txBody>
+      </p:sp>
+      <p:cxnSp>
+        <p:nvCxnSpPr>
+          <p:cNvPr id="23" name="Straight Arrow Connector 22">
+            <a:extLst>
+              <a:ext uri="{FF2B5EF4-FFF2-40B4-BE49-F238E27FC236}">
+                <a16:creationId xmlns:a16="http://schemas.microsoft.com/office/drawing/2014/main" id="{C339E487-96C8-41EA-B22C-2DB6DDF3B9FE}"/>
+              </a:ext>
+            </a:extLst>
+          </p:cNvPr>
+          <p:cNvCxnSpPr>
+            <a:stCxn id="3" idx="2"/>
+            <a:endCxn id="8" idx="0"/>
+          </p:cNvCxnSpPr>
+          <p:nvPr/>
+        </p:nvCxnSpPr>
+        <p:spPr>
+          <a:xfrm>
+            <a:off x="2256967" y="859971"/>
+            <a:ext cx="0" cy="428172"/>
+          </a:xfrm>
+          <a:prstGeom prst="straightConnector1">
+            <a:avLst/>
+          </a:prstGeom>
+          <a:ln>
+            <a:tailEnd type="triangle"/>
+          </a:ln>
+        </p:spPr>
+        <p:style>
+          <a:lnRef idx="1">
+            <a:schemeClr val="accent1"/>
+          </a:lnRef>
+          <a:fillRef idx="0">
+            <a:schemeClr val="accent1"/>
+          </a:fillRef>
+          <a:effectRef idx="0">
+            <a:schemeClr val="accent1"/>
+          </a:effectRef>
+          <a:fontRef idx="minor">
+            <a:schemeClr val="tx1"/>
+          </a:fontRef>
+        </p:style>
+      </p:cxnSp>
+      <p:cxnSp>
+        <p:nvCxnSpPr>
+          <p:cNvPr id="35" name="Straight Arrow Connector 34">
+            <a:extLst>
+              <a:ext uri="{FF2B5EF4-FFF2-40B4-BE49-F238E27FC236}">
+                <a16:creationId xmlns:a16="http://schemas.microsoft.com/office/drawing/2014/main" id="{48FAE3C7-5D64-4CB7-A85C-D103DE643666}"/>
+              </a:ext>
+            </a:extLst>
+          </p:cNvPr>
+          <p:cNvCxnSpPr>
+            <a:stCxn id="8" idx="2"/>
+            <a:endCxn id="76" idx="0"/>
+          </p:cNvCxnSpPr>
+          <p:nvPr/>
+        </p:nvCxnSpPr>
+        <p:spPr>
+          <a:xfrm>
+            <a:off x="2256967" y="2050143"/>
+            <a:ext cx="0" cy="348343"/>
+          </a:xfrm>
+          <a:prstGeom prst="straightConnector1">
+            <a:avLst/>
+          </a:prstGeom>
+          <a:ln>
+            <a:tailEnd type="triangle"/>
+          </a:ln>
+        </p:spPr>
+        <p:style>
+          <a:lnRef idx="1">
+            <a:schemeClr val="accent1"/>
+          </a:lnRef>
+          <a:fillRef idx="0">
+            <a:schemeClr val="accent1"/>
+          </a:fillRef>
+          <a:effectRef idx="0">
+            <a:schemeClr val="accent1"/>
+          </a:effectRef>
+          <a:fontRef idx="minor">
+            <a:schemeClr val="tx1"/>
+          </a:fontRef>
+        </p:style>
+      </p:cxnSp>
+      <p:cxnSp>
+        <p:nvCxnSpPr>
+          <p:cNvPr id="39" name="Straight Arrow Connector 38">
+            <a:extLst>
+              <a:ext uri="{FF2B5EF4-FFF2-40B4-BE49-F238E27FC236}">
+                <a16:creationId xmlns:a16="http://schemas.microsoft.com/office/drawing/2014/main" id="{B7AA6522-0D98-4F6A-92FC-94168E1D09D7}"/>
+              </a:ext>
+            </a:extLst>
+          </p:cNvPr>
+          <p:cNvCxnSpPr>
+            <a:stCxn id="76" idx="3"/>
+            <a:endCxn id="77" idx="1"/>
+          </p:cNvCxnSpPr>
+          <p:nvPr/>
+        </p:nvCxnSpPr>
+        <p:spPr>
+          <a:xfrm>
+            <a:off x="3193138" y="2779486"/>
+            <a:ext cx="609581" cy="0"/>
+          </a:xfrm>
+          <a:prstGeom prst="straightConnector1">
+            <a:avLst/>
+          </a:prstGeom>
+          <a:ln>
+            <a:tailEnd type="triangle"/>
+          </a:ln>
+        </p:spPr>
+        <p:style>
+          <a:lnRef idx="1">
+            <a:schemeClr val="accent1"/>
+          </a:lnRef>
+          <a:fillRef idx="0">
+            <a:schemeClr val="accent1"/>
+          </a:fillRef>
+          <a:effectRef idx="0">
+            <a:schemeClr val="accent1"/>
+          </a:effectRef>
+          <a:fontRef idx="minor">
+            <a:schemeClr val="tx1"/>
+          </a:fontRef>
+        </p:style>
+      </p:cxnSp>
+      <p:cxnSp>
+        <p:nvCxnSpPr>
+          <p:cNvPr id="42" name="Straight Arrow Connector 41">
+            <a:extLst>
+              <a:ext uri="{FF2B5EF4-FFF2-40B4-BE49-F238E27FC236}">
+                <a16:creationId xmlns:a16="http://schemas.microsoft.com/office/drawing/2014/main" id="{8CC330A2-764D-48BA-A2AE-A716ED664577}"/>
+              </a:ext>
+            </a:extLst>
+          </p:cNvPr>
+          <p:cNvCxnSpPr>
+            <a:stCxn id="77" idx="3"/>
+            <a:endCxn id="78" idx="1"/>
+          </p:cNvCxnSpPr>
+          <p:nvPr/>
+        </p:nvCxnSpPr>
+        <p:spPr>
+          <a:xfrm>
+            <a:off x="5675062" y="2779486"/>
+            <a:ext cx="783814" cy="0"/>
+          </a:xfrm>
+          <a:prstGeom prst="straightConnector1">
+            <a:avLst/>
+          </a:prstGeom>
+          <a:ln>
+            <a:tailEnd type="triangle"/>
+          </a:ln>
+        </p:spPr>
+        <p:style>
+          <a:lnRef idx="1">
+            <a:schemeClr val="accent1"/>
+          </a:lnRef>
+          <a:fillRef idx="0">
+            <a:schemeClr val="accent1"/>
+          </a:fillRef>
+          <a:effectRef idx="0">
+            <a:schemeClr val="accent1"/>
+          </a:effectRef>
+          <a:fontRef idx="minor">
+            <a:schemeClr val="tx1"/>
+          </a:fontRef>
+        </p:style>
+      </p:cxnSp>
+      <p:cxnSp>
+        <p:nvCxnSpPr>
+          <p:cNvPr id="44" name="Straight Arrow Connector 43">
+            <a:extLst>
+              <a:ext uri="{FF2B5EF4-FFF2-40B4-BE49-F238E27FC236}">
+                <a16:creationId xmlns:a16="http://schemas.microsoft.com/office/drawing/2014/main" id="{439966D3-06CD-4703-9CF1-24103CE0E76A}"/>
+              </a:ext>
+            </a:extLst>
+          </p:cNvPr>
+          <p:cNvCxnSpPr>
+            <a:stCxn id="78" idx="2"/>
+            <a:endCxn id="79" idx="0"/>
+          </p:cNvCxnSpPr>
+          <p:nvPr/>
+        </p:nvCxnSpPr>
+        <p:spPr>
+          <a:xfrm flipH="1">
+            <a:off x="7395047" y="3160486"/>
+            <a:ext cx="1" cy="279400"/>
+          </a:xfrm>
+          <a:prstGeom prst="straightConnector1">
+            <a:avLst/>
+          </a:prstGeom>
+          <a:ln>
+            <a:tailEnd type="triangle"/>
+          </a:ln>
+        </p:spPr>
+        <p:style>
+          <a:lnRef idx="1">
+            <a:schemeClr val="accent1"/>
+          </a:lnRef>
+          <a:fillRef idx="0">
+            <a:schemeClr val="accent1"/>
+          </a:fillRef>
+          <a:effectRef idx="0">
+            <a:schemeClr val="accent1"/>
+          </a:effectRef>
+          <a:fontRef idx="minor">
+            <a:schemeClr val="tx1"/>
+          </a:fontRef>
+        </p:style>
+      </p:cxnSp>
+      <p:cxnSp>
+        <p:nvCxnSpPr>
+          <p:cNvPr id="48" name="Straight Arrow Connector 47">
+            <a:extLst>
+              <a:ext uri="{FF2B5EF4-FFF2-40B4-BE49-F238E27FC236}">
+                <a16:creationId xmlns:a16="http://schemas.microsoft.com/office/drawing/2014/main" id="{5389EF6B-53C2-4C25-9031-12BBAF7DA121}"/>
+              </a:ext>
+            </a:extLst>
+          </p:cNvPr>
+          <p:cNvCxnSpPr>
+            <a:stCxn id="79" idx="2"/>
+            <a:endCxn id="80" idx="0"/>
+          </p:cNvCxnSpPr>
+          <p:nvPr/>
+        </p:nvCxnSpPr>
+        <p:spPr>
+          <a:xfrm flipH="1">
+            <a:off x="7395046" y="4201886"/>
+            <a:ext cx="1" cy="286657"/>
+          </a:xfrm>
+          <a:prstGeom prst="straightConnector1">
+            <a:avLst/>
+          </a:prstGeom>
+          <a:ln>
+            <a:tailEnd type="triangle"/>
+          </a:ln>
+        </p:spPr>
+        <p:style>
+          <a:lnRef idx="1">
+            <a:schemeClr val="accent1"/>
+          </a:lnRef>
+          <a:fillRef idx="0">
+            <a:schemeClr val="accent1"/>
+          </a:fillRef>
+          <a:effectRef idx="0">
+            <a:schemeClr val="accent1"/>
+          </a:effectRef>
+          <a:fontRef idx="minor">
+            <a:schemeClr val="tx1"/>
+          </a:fontRef>
+        </p:style>
+      </p:cxnSp>
+      <p:cxnSp>
+        <p:nvCxnSpPr>
+          <p:cNvPr id="50" name="Straight Arrow Connector 49">
+            <a:extLst>
+              <a:ext uri="{FF2B5EF4-FFF2-40B4-BE49-F238E27FC236}">
+                <a16:creationId xmlns:a16="http://schemas.microsoft.com/office/drawing/2014/main" id="{660B6B68-CC3B-4FAC-A519-0F3D411AC71C}"/>
+              </a:ext>
+            </a:extLst>
+          </p:cNvPr>
+          <p:cNvCxnSpPr>
+            <a:stCxn id="80" idx="2"/>
+            <a:endCxn id="11" idx="0"/>
+          </p:cNvCxnSpPr>
+          <p:nvPr/>
+        </p:nvCxnSpPr>
+        <p:spPr>
+          <a:xfrm flipH="1">
+            <a:off x="7395045" y="5250543"/>
+            <a:ext cx="1" cy="406400"/>
+          </a:xfrm>
+          <a:prstGeom prst="straightConnector1">
+            <a:avLst/>
+          </a:prstGeom>
+          <a:ln>
+            <a:tailEnd type="triangle"/>
+          </a:ln>
+        </p:spPr>
+        <p:style>
+          <a:lnRef idx="1">
+            <a:schemeClr val="accent1"/>
+          </a:lnRef>
+          <a:fillRef idx="0">
+            <a:schemeClr val="accent1"/>
+          </a:fillRef>
+          <a:effectRef idx="0">
+            <a:schemeClr val="accent1"/>
+          </a:effectRef>
+          <a:fontRef idx="minor">
+            <a:schemeClr val="tx1"/>
+          </a:fontRef>
+        </p:style>
+      </p:cxnSp>
+      <p:cxnSp>
+        <p:nvCxnSpPr>
+          <p:cNvPr id="54" name="Connector: Elbow 53">
+            <a:extLst>
+              <a:ext uri="{FF2B5EF4-FFF2-40B4-BE49-F238E27FC236}">
+                <a16:creationId xmlns:a16="http://schemas.microsoft.com/office/drawing/2014/main" id="{B1AE3FBA-72C8-4366-AF28-242C3ED9CD78}"/>
+              </a:ext>
+            </a:extLst>
+          </p:cNvPr>
+          <p:cNvCxnSpPr>
+            <a:stCxn id="11" idx="1"/>
+            <a:endCxn id="77" idx="2"/>
+          </p:cNvCxnSpPr>
+          <p:nvPr/>
+        </p:nvCxnSpPr>
+        <p:spPr>
+          <a:xfrm rot="10800000">
+            <a:off x="4738891" y="3160487"/>
+            <a:ext cx="1074086" cy="2997199"/>
+          </a:xfrm>
+          <a:prstGeom prst="bentConnector2">
+            <a:avLst/>
+          </a:prstGeom>
+          <a:ln>
+            <a:tailEnd type="triangle"/>
+          </a:ln>
+        </p:spPr>
+        <p:style>
+          <a:lnRef idx="1">
+            <a:schemeClr val="accent1"/>
+          </a:lnRef>
+          <a:fillRef idx="0">
+            <a:schemeClr val="accent1"/>
+          </a:fillRef>
+          <a:effectRef idx="0">
+            <a:schemeClr val="accent1"/>
+          </a:effectRef>
+          <a:fontRef idx="minor">
+            <a:schemeClr val="tx1"/>
+          </a:fontRef>
+        </p:style>
+      </p:cxnSp>
+      <p:cxnSp>
+        <p:nvCxnSpPr>
+          <p:cNvPr id="61" name="Straight Arrow Connector 60">
+            <a:extLst>
+              <a:ext uri="{FF2B5EF4-FFF2-40B4-BE49-F238E27FC236}">
+                <a16:creationId xmlns:a16="http://schemas.microsoft.com/office/drawing/2014/main" id="{F1E15725-3131-44A3-BAD1-7FF915C2F85C}"/>
+              </a:ext>
+            </a:extLst>
+          </p:cNvPr>
+          <p:cNvCxnSpPr>
+            <a:stCxn id="11" idx="3"/>
+            <a:endCxn id="19" idx="2"/>
+          </p:cNvCxnSpPr>
+          <p:nvPr/>
+        </p:nvCxnSpPr>
+        <p:spPr>
+          <a:xfrm>
+            <a:off x="8977113" y="6157685"/>
+            <a:ext cx="1074087" cy="0"/>
+          </a:xfrm>
+          <a:prstGeom prst="straightConnector1">
+            <a:avLst/>
+          </a:prstGeom>
+          <a:ln>
+            <a:tailEnd type="triangle"/>
+          </a:ln>
+        </p:spPr>
+        <p:style>
+          <a:lnRef idx="1">
+            <a:schemeClr val="accent1"/>
+          </a:lnRef>
+          <a:fillRef idx="0">
+            <a:schemeClr val="accent1"/>
+          </a:fillRef>
+          <a:effectRef idx="0">
+            <a:schemeClr val="accent1"/>
+          </a:effectRef>
+          <a:fontRef idx="minor">
+            <a:schemeClr val="tx1"/>
+          </a:fontRef>
+        </p:style>
+      </p:cxnSp>
+      <p:sp>
+        <p:nvSpPr>
+          <p:cNvPr id="62" name="TextBox 61">
+            <a:extLst>
+              <a:ext uri="{FF2B5EF4-FFF2-40B4-BE49-F238E27FC236}">
+                <a16:creationId xmlns:a16="http://schemas.microsoft.com/office/drawing/2014/main" id="{7D98C9B9-C24F-470A-9710-1113B79F8D79}"/>
+              </a:ext>
+            </a:extLst>
+          </p:cNvPr>
+          <p:cNvSpPr txBox="1"/>
+          <p:nvPr/>
+        </p:nvSpPr>
+        <p:spPr>
+          <a:xfrm>
+            <a:off x="5130750" y="5831895"/>
+            <a:ext cx="558826" cy="369332"/>
+          </a:xfrm>
+          <a:prstGeom prst="rect">
+            <a:avLst/>
+          </a:prstGeom>
+          <a:noFill/>
+        </p:spPr>
+        <p:txBody>
+          <a:bodyPr wrap="square" rtlCol="0">
+            <a:spAutoFit/>
+          </a:bodyPr>
+          <a:lstStyle/>
+          <a:p>
+            <a:r>
+              <a:rPr lang="en-US" dirty="0"/>
+              <a:t>No</a:t>
+            </a:r>
+          </a:p>
+        </p:txBody>
+      </p:sp>
+      <p:sp>
+        <p:nvSpPr>
+          <p:cNvPr id="107" name="TextBox 106">
+            <a:extLst>
+              <a:ext uri="{FF2B5EF4-FFF2-40B4-BE49-F238E27FC236}">
+                <a16:creationId xmlns:a16="http://schemas.microsoft.com/office/drawing/2014/main" id="{2708A118-5F62-436B-82A5-64FD82EFF1A3}"/>
+              </a:ext>
+            </a:extLst>
+          </p:cNvPr>
+          <p:cNvSpPr txBox="1"/>
+          <p:nvPr/>
+        </p:nvSpPr>
+        <p:spPr>
+          <a:xfrm>
+            <a:off x="9361665" y="5817381"/>
+            <a:ext cx="558826" cy="369332"/>
+          </a:xfrm>
+          <a:prstGeom prst="rect">
+            <a:avLst/>
+          </a:prstGeom>
+          <a:noFill/>
+        </p:spPr>
+        <p:txBody>
+          <a:bodyPr wrap="square" rtlCol="0">
+            <a:spAutoFit/>
+          </a:bodyPr>
+          <a:lstStyle/>
+          <a:p>
+            <a:r>
+              <a:rPr lang="en-US" dirty="0"/>
+              <a:t>Yes</a:t>
+            </a:r>
+          </a:p>
+        </p:txBody>
+      </p:sp>
+    </p:spTree>
+    <p:extLst>
+      <p:ext uri="{BB962C8B-B14F-4D97-AF65-F5344CB8AC3E}">
+        <p14:creationId xmlns:p14="http://schemas.microsoft.com/office/powerpoint/2010/main" val="4002136878"/>
       </p:ext>
     </p:extLst>
   </p:cSld>

</xml_diff>